<commit_message>
add command install to README
</commit_message>
<xml_diff>
--- a/presentation.pptx
+++ b/presentation.pptx
@@ -7,12 +7,9 @@
   <p:sldIdLst>
     <p:sldId id="256" r:id="rId2"/>
     <p:sldId id="259" r:id="rId3"/>
-    <p:sldId id="260" r:id="rId4"/>
-    <p:sldId id="257" r:id="rId5"/>
-    <p:sldId id="258" r:id="rId6"/>
-    <p:sldId id="264" r:id="rId7"/>
-    <p:sldId id="263" r:id="rId8"/>
-    <p:sldId id="262" r:id="rId9"/>
+    <p:sldId id="257" r:id="rId4"/>
+    <p:sldId id="258" r:id="rId5"/>
+    <p:sldId id="264" r:id="rId6"/>
   </p:sldIdLst>
   <p:sldSz cx="12192000" cy="6858000"/>
   <p:notesSz cx="6858000" cy="9144000"/>
@@ -311,7 +308,7 @@
             <a:fld id="{B61BEF0D-F0BB-DE4B-95CE-6DB70DBA9567}" type="datetimeFigureOut">
               <a:rPr lang="en-US" dirty="0"/>
               <a:pPr/>
-              <a:t>5/5/2022</a:t>
+              <a:t>10/17/2022</a:t>
             </a:fld>
             <a:endParaRPr lang="en-US" dirty="0"/>
           </a:p>
@@ -744,7 +741,7 @@
             <a:fld id="{B61BEF0D-F0BB-DE4B-95CE-6DB70DBA9567}" type="datetimeFigureOut">
               <a:rPr lang="en-US" dirty="0"/>
               <a:pPr/>
-              <a:t>5/5/2022</a:t>
+              <a:t>10/17/2022</a:t>
             </a:fld>
             <a:endParaRPr lang="en-US" dirty="0"/>
           </a:p>
@@ -991,7 +988,7 @@
             <a:fld id="{B61BEF0D-F0BB-DE4B-95CE-6DB70DBA9567}" type="datetimeFigureOut">
               <a:rPr lang="en-US" dirty="0"/>
               <a:pPr/>
-              <a:t>5/5/2022</a:t>
+              <a:t>10/17/2022</a:t>
             </a:fld>
             <a:endParaRPr lang="en-US" dirty="0"/>
           </a:p>
@@ -1296,7 +1293,7 @@
             <a:fld id="{B61BEF0D-F0BB-DE4B-95CE-6DB70DBA9567}" type="datetimeFigureOut">
               <a:rPr lang="en-US" dirty="0"/>
               <a:pPr/>
-              <a:t>5/5/2022</a:t>
+              <a:t>10/17/2022</a:t>
             </a:fld>
             <a:endParaRPr lang="en-US" dirty="0"/>
           </a:p>
@@ -1611,7 +1608,7 @@
             <a:fld id="{B61BEF0D-F0BB-DE4B-95CE-6DB70DBA9567}" type="datetimeFigureOut">
               <a:rPr lang="en-US" dirty="0"/>
               <a:pPr/>
-              <a:t>5/5/2022</a:t>
+              <a:t>10/17/2022</a:t>
             </a:fld>
             <a:endParaRPr lang="en-US" dirty="0"/>
           </a:p>
@@ -1910,7 +1907,7 @@
             <a:fld id="{B61BEF0D-F0BB-DE4B-95CE-6DB70DBA9567}" type="datetimeFigureOut">
               <a:rPr lang="en-US" dirty="0"/>
               <a:pPr/>
-              <a:t>5/5/2022</a:t>
+              <a:t>10/17/2022</a:t>
             </a:fld>
             <a:endParaRPr lang="en-US" dirty="0"/>
           </a:p>
@@ -2274,7 +2271,7 @@
             <a:fld id="{B61BEF0D-F0BB-DE4B-95CE-6DB70DBA9567}" type="datetimeFigureOut">
               <a:rPr lang="en-US" dirty="0"/>
               <a:pPr/>
-              <a:t>5/5/2022</a:t>
+              <a:t>10/17/2022</a:t>
             </a:fld>
             <a:endParaRPr lang="en-US" dirty="0"/>
           </a:p>
@@ -2445,7 +2442,7 @@
             <a:fld id="{B61BEF0D-F0BB-DE4B-95CE-6DB70DBA9567}" type="datetimeFigureOut">
               <a:rPr lang="en-US" dirty="0"/>
               <a:pPr/>
-              <a:t>5/5/2022</a:t>
+              <a:t>10/17/2022</a:t>
             </a:fld>
             <a:endParaRPr lang="en-US" dirty="0"/>
           </a:p>
@@ -2622,7 +2619,7 @@
             <a:fld id="{B61BEF0D-F0BB-DE4B-95CE-6DB70DBA9567}" type="datetimeFigureOut">
               <a:rPr lang="en-US" dirty="0"/>
               <a:pPr/>
-              <a:t>5/5/2022</a:t>
+              <a:t>10/17/2022</a:t>
             </a:fld>
             <a:endParaRPr lang="en-US" dirty="0"/>
           </a:p>
@@ -2789,7 +2786,7 @@
             <a:fld id="{B61BEF0D-F0BB-DE4B-95CE-6DB70DBA9567}" type="datetimeFigureOut">
               <a:rPr lang="en-US" dirty="0"/>
               <a:pPr/>
-              <a:t>5/5/2022</a:t>
+              <a:t>10/17/2022</a:t>
             </a:fld>
             <a:endParaRPr lang="en-US" dirty="0"/>
           </a:p>
@@ -3036,7 +3033,7 @@
             <a:fld id="{B61BEF0D-F0BB-DE4B-95CE-6DB70DBA9567}" type="datetimeFigureOut">
               <a:rPr lang="en-US" dirty="0"/>
               <a:pPr/>
-              <a:t>5/5/2022</a:t>
+              <a:t>10/17/2022</a:t>
             </a:fld>
             <a:endParaRPr lang="en-US" dirty="0"/>
           </a:p>
@@ -3269,7 +3266,7 @@
             <a:fld id="{B61BEF0D-F0BB-DE4B-95CE-6DB70DBA9567}" type="datetimeFigureOut">
               <a:rPr lang="en-US" dirty="0"/>
               <a:pPr/>
-              <a:t>5/5/2022</a:t>
+              <a:t>10/17/2022</a:t>
             </a:fld>
             <a:endParaRPr lang="en-US" dirty="0"/>
           </a:p>
@@ -3648,7 +3645,7 @@
             <a:fld id="{B61BEF0D-F0BB-DE4B-95CE-6DB70DBA9567}" type="datetimeFigureOut">
               <a:rPr lang="en-US" dirty="0"/>
               <a:pPr/>
-              <a:t>5/5/2022</a:t>
+              <a:t>10/17/2022</a:t>
             </a:fld>
             <a:endParaRPr lang="en-US" dirty="0"/>
           </a:p>
@@ -3763,7 +3760,7 @@
             <a:fld id="{B61BEF0D-F0BB-DE4B-95CE-6DB70DBA9567}" type="datetimeFigureOut">
               <a:rPr lang="en-US" dirty="0"/>
               <a:pPr/>
-              <a:t>5/5/2022</a:t>
+              <a:t>10/17/2022</a:t>
             </a:fld>
             <a:endParaRPr lang="en-US" dirty="0"/>
           </a:p>
@@ -3855,7 +3852,7 @@
             <a:fld id="{B61BEF0D-F0BB-DE4B-95CE-6DB70DBA9567}" type="datetimeFigureOut">
               <a:rPr lang="en-US" dirty="0"/>
               <a:pPr/>
-              <a:t>5/5/2022</a:t>
+              <a:t>10/17/2022</a:t>
             </a:fld>
             <a:endParaRPr lang="en-US" dirty="0"/>
           </a:p>
@@ -4107,7 +4104,7 @@
             <a:fld id="{B61BEF0D-F0BB-DE4B-95CE-6DB70DBA9567}" type="datetimeFigureOut">
               <a:rPr lang="en-US" dirty="0"/>
               <a:pPr/>
-              <a:t>5/5/2022</a:t>
+              <a:t>10/17/2022</a:t>
             </a:fld>
             <a:endParaRPr lang="en-US" dirty="0"/>
           </a:p>
@@ -4387,7 +4384,7 @@
             <a:fld id="{B61BEF0D-F0BB-DE4B-95CE-6DB70DBA9567}" type="datetimeFigureOut">
               <a:rPr lang="en-US" dirty="0"/>
               <a:pPr/>
-              <a:t>5/5/2022</a:t>
+              <a:t>10/17/2022</a:t>
             </a:fld>
             <a:endParaRPr lang="en-US" dirty="0"/>
           </a:p>
@@ -4790,7 +4787,7 @@
             <a:fld id="{B61BEF0D-F0BB-DE4B-95CE-6DB70DBA9567}" type="datetimeFigureOut">
               <a:rPr lang="en-US" dirty="0"/>
               <a:pPr/>
-              <a:t>5/5/2022</a:t>
+              <a:t>10/17/2022</a:t>
             </a:fld>
             <a:endParaRPr lang="en-US" dirty="0"/>
           </a:p>
@@ -5326,7 +5323,7 @@
           <p:cNvPr id="2" name="Заголовок 1">
             <a:extLst>
               <a:ext uri="{FF2B5EF4-FFF2-40B4-BE49-F238E27FC236}">
-                <a16:creationId xmlns:a16="http://schemas.microsoft.com/office/drawing/2014/main" id="{4EE3562E-5A77-439A-9C54-43C6C57D7DA4}"/>
+                <a16:creationId xmlns:a16="http://schemas.microsoft.com/office/drawing/2014/main" xmlns="" id="{4EE3562E-5A77-439A-9C54-43C6C57D7DA4}"/>
               </a:ext>
             </a:extLst>
           </p:cNvPr>
@@ -5361,7 +5358,7 @@
           <p:cNvPr id="3" name="Подзаголовок 2">
             <a:extLst>
               <a:ext uri="{FF2B5EF4-FFF2-40B4-BE49-F238E27FC236}">
-                <a16:creationId xmlns:a16="http://schemas.microsoft.com/office/drawing/2014/main" id="{B9317856-7FF1-4C87-A96B-E80A7856A25C}"/>
+                <a16:creationId xmlns:a16="http://schemas.microsoft.com/office/drawing/2014/main" xmlns="" id="{B9317856-7FF1-4C87-A96B-E80A7856A25C}"/>
               </a:ext>
             </a:extLst>
           </p:cNvPr>
@@ -5480,7 +5477,7 @@
           <p:cNvPr id="6" name="Рисунок 5">
             <a:extLst>
               <a:ext uri="{FF2B5EF4-FFF2-40B4-BE49-F238E27FC236}">
-                <a16:creationId xmlns:a16="http://schemas.microsoft.com/office/drawing/2014/main" id="{FF2FCD40-9FBC-486D-8614-26502494FDA1}"/>
+                <a16:creationId xmlns:a16="http://schemas.microsoft.com/office/drawing/2014/main" xmlns="" id="{FF2FCD40-9FBC-486D-8614-26502494FDA1}"/>
               </a:ext>
             </a:extLst>
           </p:cNvPr>
@@ -5510,7 +5507,7 @@
           <p:cNvPr id="1026" name="Picture 2">
             <a:extLst>
               <a:ext uri="{FF2B5EF4-FFF2-40B4-BE49-F238E27FC236}">
-                <a16:creationId xmlns:a16="http://schemas.microsoft.com/office/drawing/2014/main" id="{1853E300-D2AB-4D1B-9D00-064856279FD2}"/>
+                <a16:creationId xmlns:a16="http://schemas.microsoft.com/office/drawing/2014/main" xmlns="" id="{1853E300-D2AB-4D1B-9D00-064856279FD2}"/>
               </a:ext>
             </a:extLst>
           </p:cNvPr>
@@ -5557,7 +5554,7 @@
           <p:cNvPr id="8" name="Рисунок 7">
             <a:extLst>
               <a:ext uri="{FF2B5EF4-FFF2-40B4-BE49-F238E27FC236}">
-                <a16:creationId xmlns:a16="http://schemas.microsoft.com/office/drawing/2014/main" id="{2C744856-E4EE-48F4-8AB8-F1B7BFB35E20}"/>
+                <a16:creationId xmlns:a16="http://schemas.microsoft.com/office/drawing/2014/main" xmlns="" id="{2C744856-E4EE-48F4-8AB8-F1B7BFB35E20}"/>
               </a:ext>
             </a:extLst>
           </p:cNvPr>
@@ -5617,7 +5614,7 @@
           <p:cNvPr id="2" name="Заголовок 1">
             <a:extLst>
               <a:ext uri="{FF2B5EF4-FFF2-40B4-BE49-F238E27FC236}">
-                <a16:creationId xmlns:a16="http://schemas.microsoft.com/office/drawing/2014/main" id="{4EE3562E-5A77-439A-9C54-43C6C57D7DA4}"/>
+                <a16:creationId xmlns:a16="http://schemas.microsoft.com/office/drawing/2014/main" xmlns="" id="{4EE3562E-5A77-439A-9C54-43C6C57D7DA4}"/>
               </a:ext>
             </a:extLst>
           </p:cNvPr>
@@ -5653,7 +5650,7 @@
           <p:cNvPr id="3" name="Подзаголовок 2">
             <a:extLst>
               <a:ext uri="{FF2B5EF4-FFF2-40B4-BE49-F238E27FC236}">
-                <a16:creationId xmlns:a16="http://schemas.microsoft.com/office/drawing/2014/main" id="{B9317856-7FF1-4C87-A96B-E80A7856A25C}"/>
+                <a16:creationId xmlns:a16="http://schemas.microsoft.com/office/drawing/2014/main" xmlns="" id="{B9317856-7FF1-4C87-A96B-E80A7856A25C}"/>
               </a:ext>
             </a:extLst>
           </p:cNvPr>
@@ -5766,7 +5763,7 @@
           <p:cNvPr id="6" name="Рисунок 5">
             <a:extLst>
               <a:ext uri="{FF2B5EF4-FFF2-40B4-BE49-F238E27FC236}">
-                <a16:creationId xmlns:a16="http://schemas.microsoft.com/office/drawing/2014/main" id="{FF2FCD40-9FBC-486D-8614-26502494FDA1}"/>
+                <a16:creationId xmlns:a16="http://schemas.microsoft.com/office/drawing/2014/main" xmlns="" id="{FF2FCD40-9FBC-486D-8614-26502494FDA1}"/>
               </a:ext>
             </a:extLst>
           </p:cNvPr>
@@ -5796,7 +5793,7 @@
           <p:cNvPr id="1026" name="Picture 2">
             <a:extLst>
               <a:ext uri="{FF2B5EF4-FFF2-40B4-BE49-F238E27FC236}">
-                <a16:creationId xmlns:a16="http://schemas.microsoft.com/office/drawing/2014/main" id="{1853E300-D2AB-4D1B-9D00-064856279FD2}"/>
+                <a16:creationId xmlns:a16="http://schemas.microsoft.com/office/drawing/2014/main" xmlns="" id="{1853E300-D2AB-4D1B-9D00-064856279FD2}"/>
               </a:ext>
             </a:extLst>
           </p:cNvPr>
@@ -5873,7 +5870,7 @@
           <p:cNvPr id="2" name="Заголовок 1">
             <a:extLst>
               <a:ext uri="{FF2B5EF4-FFF2-40B4-BE49-F238E27FC236}">
-                <a16:creationId xmlns:a16="http://schemas.microsoft.com/office/drawing/2014/main" id="{4EE3562E-5A77-439A-9C54-43C6C57D7DA4}"/>
+                <a16:creationId xmlns:a16="http://schemas.microsoft.com/office/drawing/2014/main" xmlns="" id="{4EE3562E-5A77-439A-9C54-43C6C57D7DA4}"/>
               </a:ext>
             </a:extLst>
           </p:cNvPr>
@@ -5886,8 +5883,8 @@
         </p:nvSpPr>
         <p:spPr>
           <a:xfrm>
-            <a:off x="591931" y="249571"/>
-            <a:ext cx="7578945" cy="788565"/>
+            <a:off x="172483" y="0"/>
+            <a:ext cx="4701521" cy="788565"/>
           </a:xfrm>
         </p:spPr>
         <p:txBody>
@@ -5898,7 +5895,7 @@
           <a:p>
             <a:r>
               <a:rPr lang="ru-RU" dirty="0"/>
-              <a:t>Основные учебные цели</a:t>
+              <a:t>Архитектура</a:t>
             </a:r>
           </a:p>
         </p:txBody>
@@ -5908,7 +5905,7 @@
           <p:cNvPr id="3" name="Подзаголовок 2">
             <a:extLst>
               <a:ext uri="{FF2B5EF4-FFF2-40B4-BE49-F238E27FC236}">
-                <a16:creationId xmlns:a16="http://schemas.microsoft.com/office/drawing/2014/main" id="{B9317856-7FF1-4C87-A96B-E80A7856A25C}"/>
+                <a16:creationId xmlns:a16="http://schemas.microsoft.com/office/drawing/2014/main" xmlns="" id="{B9317856-7FF1-4C87-A96B-E80A7856A25C}"/>
               </a:ext>
             </a:extLst>
           </p:cNvPr>
@@ -5921,51 +5918,71 @@
         </p:nvSpPr>
         <p:spPr>
           <a:xfrm>
-            <a:off x="591931" y="1752056"/>
-            <a:ext cx="7771892" cy="4343788"/>
+            <a:off x="4833577" y="0"/>
+            <a:ext cx="4553704" cy="1568741"/>
           </a:xfrm>
         </p:spPr>
         <p:txBody>
           <a:bodyPr>
-            <a:normAutofit/>
+            <a:normAutofit fontScale="92500" lnSpcReduction="10000"/>
           </a:bodyPr>
           <a:lstStyle/>
           <a:p>
             <a:r>
+              <a:rPr lang="ru-RU" b="1" dirty="0"/>
+              <a:t>Основные слои приложения: </a:t>
+            </a:r>
+          </a:p>
+          <a:p>
+            <a:pPr marL="342900" indent="-342900">
+              <a:buFontTx/>
+              <a:buChar char="-"/>
+            </a:pPr>
+            <a:r>
+              <a:rPr lang="en-US" dirty="0"/>
+              <a:t>bot (</a:t>
+            </a:r>
+            <a:r>
               <a:rPr lang="ru-RU" dirty="0"/>
-              <a:t>Закрепление знаний о </a:t>
-            </a:r>
+              <a:t>работа с телеграмм)</a:t>
+            </a:r>
+          </a:p>
+          <a:p>
+            <a:pPr marL="342900" indent="-342900">
+              <a:buFontTx/>
+              <a:buChar char="-"/>
+            </a:pPr>
             <a:r>
               <a:rPr lang="en-US" dirty="0"/>
-              <a:t>python</a:t>
-            </a:r>
-          </a:p>
-          <a:p>
+              <a:t>rapid (</a:t>
+            </a:r>
             <a:r>
               <a:rPr lang="ru-RU" dirty="0"/>
-              <a:t>Расширение знаний в направлении ООП</a:t>
-            </a:r>
-          </a:p>
-          <a:p>
+              <a:t>работа с </a:t>
+            </a:r>
+            <a:r>
+              <a:rPr lang="en-US" dirty="0"/>
+              <a:t>hotel.com)</a:t>
+            </a:r>
+            <a:endParaRPr lang="ru-RU" dirty="0"/>
+          </a:p>
+          <a:p>
+            <a:pPr marL="342900" indent="-342900">
+              <a:buFontTx/>
+              <a:buChar char="-"/>
+            </a:pPr>
+            <a:r>
+              <a:rPr lang="en-US" dirty="0" err="1"/>
+              <a:t>db</a:t>
+            </a:r>
+            <a:r>
+              <a:rPr lang="en-US" dirty="0"/>
+              <a:t> (</a:t>
+            </a:r>
             <a:r>
               <a:rPr lang="ru-RU" dirty="0"/>
-              <a:t>Изучение основных паттернов проектирования</a:t>
-            </a:r>
-          </a:p>
-          <a:p>
-            <a:r>
-              <a:rPr lang="ru-RU" dirty="0"/>
-              <a:t>Построение гибкой структуры приложения</a:t>
-            </a:r>
-          </a:p>
-          <a:p>
-            <a:r>
-              <a:rPr lang="ru-RU" dirty="0"/>
-              <a:t>Работа с базой данных</a:t>
-            </a:r>
-          </a:p>
-          <a:p>
-            <a:endParaRPr lang="ru-RU" dirty="0"/>
+              <a:t>база данных)</a:t>
+            </a:r>
           </a:p>
         </p:txBody>
       </p:sp>
@@ -5974,7 +5991,7 @@
           <p:cNvPr id="6" name="Рисунок 5">
             <a:extLst>
               <a:ext uri="{FF2B5EF4-FFF2-40B4-BE49-F238E27FC236}">
-                <a16:creationId xmlns:a16="http://schemas.microsoft.com/office/drawing/2014/main" id="{FF2FCD40-9FBC-486D-8614-26502494FDA1}"/>
+                <a16:creationId xmlns:a16="http://schemas.microsoft.com/office/drawing/2014/main" xmlns="" id="{FF2FCD40-9FBC-486D-8614-26502494FDA1}"/>
               </a:ext>
             </a:extLst>
           </p:cNvPr>
@@ -6004,7 +6021,7 @@
           <p:cNvPr id="1026" name="Picture 2">
             <a:extLst>
               <a:ext uri="{FF2B5EF4-FFF2-40B4-BE49-F238E27FC236}">
-                <a16:creationId xmlns:a16="http://schemas.microsoft.com/office/drawing/2014/main" id="{1853E300-D2AB-4D1B-9D00-064856279FD2}"/>
+                <a16:creationId xmlns:a16="http://schemas.microsoft.com/office/drawing/2014/main" xmlns="" id="{1853E300-D2AB-4D1B-9D00-064856279FD2}"/>
               </a:ext>
             </a:extLst>
           </p:cNvPr>
@@ -6046,10 +6063,305 @@
           </a:extLst>
         </p:spPr>
       </p:pic>
+      <p:pic>
+        <p:nvPicPr>
+          <p:cNvPr id="5" name="Рисунок 4">
+            <a:extLst>
+              <a:ext uri="{FF2B5EF4-FFF2-40B4-BE49-F238E27FC236}">
+                <a16:creationId xmlns:a16="http://schemas.microsoft.com/office/drawing/2014/main" xmlns="" id="{9D0584F9-1D52-43A7-8272-0E508219E023}"/>
+              </a:ext>
+            </a:extLst>
+          </p:cNvPr>
+          <p:cNvPicPr>
+            <a:picLocks noChangeAspect="1"/>
+          </p:cNvPicPr>
+          <p:nvPr/>
+        </p:nvPicPr>
+        <p:blipFill>
+          <a:blip r:embed="rId4"/>
+          <a:srcRect/>
+          <a:stretch/>
+        </p:blipFill>
+        <p:spPr>
+          <a:xfrm>
+            <a:off x="1253082" y="1568741"/>
+            <a:ext cx="8846428" cy="4937720"/>
+          </a:xfrm>
+          <a:prstGeom prst="rect">
+            <a:avLst/>
+          </a:prstGeom>
+        </p:spPr>
+      </p:pic>
+      <p:sp>
+        <p:nvSpPr>
+          <p:cNvPr id="7" name="Подзаголовок 2">
+            <a:extLst>
+              <a:ext uri="{FF2B5EF4-FFF2-40B4-BE49-F238E27FC236}">
+                <a16:creationId xmlns:a16="http://schemas.microsoft.com/office/drawing/2014/main" xmlns="" id="{FAF3B0AF-D443-465C-ABCE-522E5EEB244D}"/>
+              </a:ext>
+            </a:extLst>
+          </p:cNvPr>
+          <p:cNvSpPr txBox="1">
+            <a:spLocks/>
+          </p:cNvSpPr>
+          <p:nvPr/>
+        </p:nvSpPr>
+        <p:spPr>
+          <a:xfrm>
+            <a:off x="1162605" y="673216"/>
+            <a:ext cx="1756764" cy="669024"/>
+          </a:xfrm>
+          <a:prstGeom prst="rect">
+            <a:avLst/>
+          </a:prstGeom>
+        </p:spPr>
+        <p:txBody>
+          <a:bodyPr vert="horz" lIns="91440" tIns="45720" rIns="91440" bIns="45720" rtlCol="0" anchor="t">
+            <a:normAutofit/>
+          </a:bodyPr>
+          <a:lstStyle>
+            <a:lvl1pPr marL="0" indent="0" algn="l" defTabSz="457200" rtl="0" eaLnBrk="1" latinLnBrk="0" hangingPunct="1">
+              <a:spcBef>
+                <a:spcPct val="20000"/>
+              </a:spcBef>
+              <a:spcAft>
+                <a:spcPts val="600"/>
+              </a:spcAft>
+              <a:buClr>
+                <a:schemeClr val="tx1"/>
+              </a:buClr>
+              <a:buSzPct val="80000"/>
+              <a:buFont typeface="Wingdings 3" panose="05040102010807070707" pitchFamily="18" charset="2"/>
+              <a:buNone/>
+              <a:defRPr sz="2100" kern="1200" cap="none">
+                <a:solidFill>
+                  <a:schemeClr val="bg2">
+                    <a:lumMod val="75000"/>
+                  </a:schemeClr>
+                </a:solidFill>
+                <a:effectLst/>
+                <a:latin typeface="+mn-lt"/>
+                <a:ea typeface="+mn-ea"/>
+                <a:cs typeface="+mn-cs"/>
+              </a:defRPr>
+            </a:lvl1pPr>
+            <a:lvl2pPr marL="457200" indent="0" algn="ctr" defTabSz="457200" rtl="0" eaLnBrk="1" latinLnBrk="0" hangingPunct="1">
+              <a:spcBef>
+                <a:spcPct val="20000"/>
+              </a:spcBef>
+              <a:spcAft>
+                <a:spcPts val="600"/>
+              </a:spcAft>
+              <a:buClr>
+                <a:schemeClr val="tx1"/>
+              </a:buClr>
+              <a:buSzPct val="80000"/>
+              <a:buFont typeface="Wingdings 3" panose="05040102010807070707" pitchFamily="18" charset="2"/>
+              <a:buNone/>
+              <a:defRPr sz="1800" kern="1200" cap="none">
+                <a:solidFill>
+                  <a:schemeClr val="tx1">
+                    <a:tint val="75000"/>
+                  </a:schemeClr>
+                </a:solidFill>
+                <a:effectLst/>
+                <a:latin typeface="+mn-lt"/>
+                <a:ea typeface="+mn-ea"/>
+                <a:cs typeface="+mn-cs"/>
+              </a:defRPr>
+            </a:lvl2pPr>
+            <a:lvl3pPr marL="914400" indent="0" algn="ctr" defTabSz="457200" rtl="0" eaLnBrk="1" latinLnBrk="0" hangingPunct="1">
+              <a:spcBef>
+                <a:spcPct val="20000"/>
+              </a:spcBef>
+              <a:spcAft>
+                <a:spcPts val="600"/>
+              </a:spcAft>
+              <a:buClr>
+                <a:schemeClr val="tx1"/>
+              </a:buClr>
+              <a:buSzPct val="80000"/>
+              <a:buFont typeface="Wingdings 3" panose="05040102010807070707" pitchFamily="18" charset="2"/>
+              <a:buNone/>
+              <a:defRPr sz="1600" kern="1200" cap="none">
+                <a:solidFill>
+                  <a:schemeClr val="tx1">
+                    <a:tint val="75000"/>
+                  </a:schemeClr>
+                </a:solidFill>
+                <a:effectLst/>
+                <a:latin typeface="+mn-lt"/>
+                <a:ea typeface="+mn-ea"/>
+                <a:cs typeface="+mn-cs"/>
+              </a:defRPr>
+            </a:lvl3pPr>
+            <a:lvl4pPr marL="1371600" indent="0" algn="ctr" defTabSz="457200" rtl="0" eaLnBrk="1" latinLnBrk="0" hangingPunct="1">
+              <a:spcBef>
+                <a:spcPct val="20000"/>
+              </a:spcBef>
+              <a:spcAft>
+                <a:spcPts val="600"/>
+              </a:spcAft>
+              <a:buClr>
+                <a:schemeClr val="tx1"/>
+              </a:buClr>
+              <a:buSzPct val="80000"/>
+              <a:buFont typeface="Wingdings 3" panose="05040102010807070707" pitchFamily="18" charset="2"/>
+              <a:buNone/>
+              <a:defRPr sz="1400" kern="1200" cap="none">
+                <a:solidFill>
+                  <a:schemeClr val="tx1">
+                    <a:tint val="75000"/>
+                  </a:schemeClr>
+                </a:solidFill>
+                <a:effectLst/>
+                <a:latin typeface="+mn-lt"/>
+                <a:ea typeface="+mn-ea"/>
+                <a:cs typeface="+mn-cs"/>
+              </a:defRPr>
+            </a:lvl4pPr>
+            <a:lvl5pPr marL="1828800" indent="0" algn="ctr" defTabSz="457200" rtl="0" eaLnBrk="1" latinLnBrk="0" hangingPunct="1">
+              <a:spcBef>
+                <a:spcPct val="20000"/>
+              </a:spcBef>
+              <a:spcAft>
+                <a:spcPts val="600"/>
+              </a:spcAft>
+              <a:buClr>
+                <a:schemeClr val="tx1"/>
+              </a:buClr>
+              <a:buSzPct val="80000"/>
+              <a:buFont typeface="Wingdings 3" panose="05040102010807070707" pitchFamily="18" charset="2"/>
+              <a:buNone/>
+              <a:defRPr sz="1400" kern="1200" cap="none">
+                <a:solidFill>
+                  <a:schemeClr val="tx1">
+                    <a:tint val="75000"/>
+                  </a:schemeClr>
+                </a:solidFill>
+                <a:effectLst/>
+                <a:latin typeface="+mn-lt"/>
+                <a:ea typeface="+mn-ea"/>
+                <a:cs typeface="+mn-cs"/>
+              </a:defRPr>
+            </a:lvl5pPr>
+            <a:lvl6pPr marL="2286000" indent="0" algn="ctr" defTabSz="457200" rtl="0" eaLnBrk="1" latinLnBrk="0" hangingPunct="1">
+              <a:spcBef>
+                <a:spcPct val="20000"/>
+              </a:spcBef>
+              <a:spcAft>
+                <a:spcPts val="600"/>
+              </a:spcAft>
+              <a:buClr>
+                <a:schemeClr val="tx1"/>
+              </a:buClr>
+              <a:buSzPct val="80000"/>
+              <a:buFont typeface="Wingdings 3" panose="05040102010807070707" pitchFamily="18" charset="2"/>
+              <a:buNone/>
+              <a:defRPr sz="1400" kern="1200" cap="none">
+                <a:solidFill>
+                  <a:schemeClr val="tx1">
+                    <a:tint val="75000"/>
+                  </a:schemeClr>
+                </a:solidFill>
+                <a:effectLst/>
+                <a:latin typeface="+mn-lt"/>
+                <a:ea typeface="+mn-ea"/>
+                <a:cs typeface="+mn-cs"/>
+              </a:defRPr>
+            </a:lvl6pPr>
+            <a:lvl7pPr marL="2743200" indent="0" algn="ctr" defTabSz="457200" rtl="0" eaLnBrk="1" latinLnBrk="0" hangingPunct="1">
+              <a:spcBef>
+                <a:spcPct val="20000"/>
+              </a:spcBef>
+              <a:spcAft>
+                <a:spcPts val="600"/>
+              </a:spcAft>
+              <a:buClr>
+                <a:schemeClr val="tx1"/>
+              </a:buClr>
+              <a:buSzPct val="80000"/>
+              <a:buFont typeface="Wingdings 3" panose="05040102010807070707" pitchFamily="18" charset="2"/>
+              <a:buNone/>
+              <a:defRPr sz="1400" kern="1200" cap="none">
+                <a:solidFill>
+                  <a:schemeClr val="tx1">
+                    <a:tint val="75000"/>
+                  </a:schemeClr>
+                </a:solidFill>
+                <a:effectLst/>
+                <a:latin typeface="+mn-lt"/>
+                <a:ea typeface="+mn-ea"/>
+                <a:cs typeface="+mn-cs"/>
+              </a:defRPr>
+            </a:lvl7pPr>
+            <a:lvl8pPr marL="3200400" indent="0" algn="ctr" defTabSz="457200" rtl="0" eaLnBrk="1" latinLnBrk="0" hangingPunct="1">
+              <a:spcBef>
+                <a:spcPct val="20000"/>
+              </a:spcBef>
+              <a:spcAft>
+                <a:spcPts val="600"/>
+              </a:spcAft>
+              <a:buClr>
+                <a:schemeClr val="tx1"/>
+              </a:buClr>
+              <a:buSzPct val="80000"/>
+              <a:buFont typeface="Wingdings 3" panose="05040102010807070707" pitchFamily="18" charset="2"/>
+              <a:buNone/>
+              <a:defRPr sz="1400" kern="1200" cap="none">
+                <a:solidFill>
+                  <a:schemeClr val="tx1">
+                    <a:tint val="75000"/>
+                  </a:schemeClr>
+                </a:solidFill>
+                <a:effectLst/>
+                <a:latin typeface="+mn-lt"/>
+                <a:ea typeface="+mn-ea"/>
+                <a:cs typeface="+mn-cs"/>
+              </a:defRPr>
+            </a:lvl8pPr>
+            <a:lvl9pPr marL="3657600" indent="0" algn="ctr" defTabSz="457200" rtl="0" eaLnBrk="1" latinLnBrk="0" hangingPunct="1">
+              <a:spcBef>
+                <a:spcPct val="20000"/>
+              </a:spcBef>
+              <a:spcAft>
+                <a:spcPts val="600"/>
+              </a:spcAft>
+              <a:buClr>
+                <a:schemeClr val="tx1"/>
+              </a:buClr>
+              <a:buSzPct val="80000"/>
+              <a:buFont typeface="Wingdings 3" panose="05040102010807070707" pitchFamily="18" charset="2"/>
+              <a:buNone/>
+              <a:defRPr sz="1400" kern="1200" cap="none">
+                <a:solidFill>
+                  <a:schemeClr val="tx1">
+                    <a:tint val="75000"/>
+                  </a:schemeClr>
+                </a:solidFill>
+                <a:effectLst/>
+                <a:latin typeface="+mn-lt"/>
+                <a:ea typeface="+mn-ea"/>
+                <a:cs typeface="+mn-cs"/>
+              </a:defRPr>
+            </a:lvl9pPr>
+          </a:lstStyle>
+          <a:p>
+            <a:r>
+              <a:rPr lang="ru-RU" b="1" dirty="0">
+                <a:solidFill>
+                  <a:schemeClr val="tx1"/>
+                </a:solidFill>
+              </a:rPr>
+              <a:t>(монолит)</a:t>
+            </a:r>
+          </a:p>
+        </p:txBody>
+      </p:sp>
     </p:spTree>
     <p:extLst>
       <p:ext uri="{BB962C8B-B14F-4D97-AF65-F5344CB8AC3E}">
-        <p14:creationId xmlns:p14="http://schemas.microsoft.com/office/powerpoint/2010/main" val="3946609216"/>
+        <p14:creationId xmlns:p14="http://schemas.microsoft.com/office/powerpoint/2010/main" val="2589671466"/>
       </p:ext>
     </p:extLst>
   </p:cSld>
@@ -6081,7 +6393,7 @@
           <p:cNvPr id="2" name="Заголовок 1">
             <a:extLst>
               <a:ext uri="{FF2B5EF4-FFF2-40B4-BE49-F238E27FC236}">
-                <a16:creationId xmlns:a16="http://schemas.microsoft.com/office/drawing/2014/main" id="{4EE3562E-5A77-439A-9C54-43C6C57D7DA4}"/>
+                <a16:creationId xmlns:a16="http://schemas.microsoft.com/office/drawing/2014/main" xmlns="" id="{4EE3562E-5A77-439A-9C54-43C6C57D7DA4}"/>
               </a:ext>
             </a:extLst>
           </p:cNvPr>
@@ -6116,7 +6428,7 @@
           <p:cNvPr id="3" name="Подзаголовок 2">
             <a:extLst>
               <a:ext uri="{FF2B5EF4-FFF2-40B4-BE49-F238E27FC236}">
-                <a16:creationId xmlns:a16="http://schemas.microsoft.com/office/drawing/2014/main" id="{B9317856-7FF1-4C87-A96B-E80A7856A25C}"/>
+                <a16:creationId xmlns:a16="http://schemas.microsoft.com/office/drawing/2014/main" xmlns="" id="{B9317856-7FF1-4C87-A96B-E80A7856A25C}"/>
               </a:ext>
             </a:extLst>
           </p:cNvPr>
@@ -6129,19 +6441,19 @@
         </p:nvSpPr>
         <p:spPr>
           <a:xfrm>
-            <a:off x="4833577" y="0"/>
-            <a:ext cx="4553704" cy="1568741"/>
+            <a:off x="404188" y="1132514"/>
+            <a:ext cx="9108928" cy="4437776"/>
           </a:xfrm>
         </p:spPr>
         <p:txBody>
           <a:bodyPr>
-            <a:normAutofit fontScale="92500" lnSpcReduction="10000"/>
+            <a:normAutofit lnSpcReduction="10000"/>
           </a:bodyPr>
           <a:lstStyle/>
           <a:p>
             <a:r>
               <a:rPr lang="ru-RU" b="1" dirty="0"/>
-              <a:t>Основные слои приложения: </a:t>
+              <a:t>Использованные паттерны проектирования:</a:t>
             </a:r>
           </a:p>
           <a:p>
@@ -6150,12 +6462,16 @@
               <a:buChar char="-"/>
             </a:pPr>
             <a:r>
+              <a:rPr lang="ru-RU" dirty="0"/>
+              <a:t>абстрактная фабрика (</a:t>
+            </a:r>
+            <a:r>
               <a:rPr lang="en-US" dirty="0"/>
-              <a:t>bot (</a:t>
+              <a:t>main)</a:t>
             </a:r>
             <a:r>
               <a:rPr lang="ru-RU" dirty="0"/>
-              <a:t>работа с телеграмм)</a:t>
+              <a:t>;</a:t>
             </a:r>
           </a:p>
           <a:p>
@@ -6164,18 +6480,33 @@
               <a:buChar char="-"/>
             </a:pPr>
             <a:r>
+              <a:rPr lang="ru-RU" dirty="0"/>
+              <a:t>фабричный метод</a:t>
+            </a:r>
+            <a:r>
               <a:rPr lang="en-US" dirty="0"/>
-              <a:t>rapid (</a:t>
+              <a:t> (</a:t>
+            </a:r>
+            <a:r>
+              <a:rPr lang="en-US" dirty="0" err="1"/>
+              <a:t>handler_message</a:t>
+            </a:r>
+            <a:r>
+              <a:rPr lang="en-US" dirty="0"/>
+              <a:t>, </a:t>
+            </a:r>
+            <a:r>
+              <a:rPr lang="en-US" dirty="0" err="1"/>
+              <a:t>command_message</a:t>
+            </a:r>
+            <a:r>
+              <a:rPr lang="en-US" dirty="0"/>
+              <a:t>)</a:t>
             </a:r>
             <a:r>
               <a:rPr lang="ru-RU" dirty="0"/>
-              <a:t>работа с </a:t>
-            </a:r>
-            <a:r>
-              <a:rPr lang="en-US" dirty="0"/>
-              <a:t>hotel.com)</a:t>
-            </a:r>
-            <a:endParaRPr lang="ru-RU" dirty="0"/>
+              <a:t>;</a:t>
+            </a:r>
           </a:p>
           <a:p>
             <a:pPr marL="342900" indent="-342900">
@@ -6183,17 +6514,101 @@
               <a:buChar char="-"/>
             </a:pPr>
             <a:r>
+              <a:rPr lang="ru-RU" dirty="0"/>
+              <a:t>одиночка</a:t>
+            </a:r>
+            <a:r>
+              <a:rPr lang="en-US" dirty="0"/>
+              <a:t> (registry)</a:t>
+            </a:r>
+            <a:r>
+              <a:rPr lang="ru-RU" dirty="0"/>
+              <a:t>;</a:t>
+            </a:r>
+          </a:p>
+          <a:p>
+            <a:pPr marL="342900" indent="-342900">
+              <a:buFontTx/>
+              <a:buChar char="-"/>
+            </a:pPr>
+            <a:r>
+              <a:rPr lang="ru-RU" dirty="0"/>
+              <a:t>фасад</a:t>
+            </a:r>
+            <a:r>
+              <a:rPr lang="en-US" dirty="0"/>
+              <a:t> (rapid – </a:t>
+            </a:r>
+            <a:r>
+              <a:rPr lang="ru-RU" dirty="0"/>
+              <a:t>внешний интерфейс);</a:t>
+            </a:r>
+          </a:p>
+          <a:p>
+            <a:pPr marL="342900" indent="-342900">
+              <a:buFontTx/>
+              <a:buChar char="-"/>
+            </a:pPr>
+            <a:r>
+              <a:rPr lang="ru-RU" dirty="0"/>
+              <a:t>строитель (</a:t>
+            </a:r>
+            <a:r>
+              <a:rPr lang="en-US" dirty="0"/>
+              <a:t>conversation)</a:t>
+            </a:r>
+            <a:r>
+              <a:rPr lang="ru-RU" dirty="0"/>
+              <a:t>;</a:t>
+            </a:r>
+          </a:p>
+          <a:p>
+            <a:pPr marL="342900" indent="-342900">
+              <a:buFontTx/>
+              <a:buChar char="-"/>
+            </a:pPr>
+            <a:r>
+              <a:rPr lang="ru-RU" dirty="0"/>
+              <a:t>стратегия</a:t>
+            </a:r>
+            <a:r>
+              <a:rPr lang="en-US" dirty="0"/>
+              <a:t> (</a:t>
+            </a:r>
+            <a:r>
               <a:rPr lang="en-US" dirty="0" err="1"/>
               <a:t>db</a:t>
             </a:r>
             <a:r>
               <a:rPr lang="en-US" dirty="0"/>
-              <a:t> (</a:t>
-            </a:r>
+              <a:t>)</a:t>
+            </a:r>
+            <a:endParaRPr lang="ru-RU" dirty="0"/>
+          </a:p>
+          <a:p>
+            <a:endParaRPr lang="ru-RU" dirty="0"/>
+          </a:p>
+          <a:p>
+            <a:r>
+              <a:rPr lang="ru-RU" b="1" dirty="0"/>
+              <a:t>Использованные архитектурные паттерны:</a:t>
+            </a:r>
+            <a:endParaRPr lang="ru-RU" dirty="0"/>
+          </a:p>
+          <a:p>
+            <a:pPr marL="342900" indent="-342900">
+              <a:buFontTx/>
+              <a:buChar char="-"/>
+            </a:pPr>
             <a:r>
               <a:rPr lang="ru-RU" dirty="0"/>
-              <a:t>база данных)</a:t>
-            </a:r>
+              <a:t>реестр </a:t>
+            </a:r>
+            <a:r>
+              <a:rPr lang="en-US" dirty="0"/>
+              <a:t>(registry)</a:t>
+            </a:r>
+            <a:endParaRPr lang="ru-RU" dirty="0"/>
           </a:p>
         </p:txBody>
       </p:sp>
@@ -6202,7 +6617,7 @@
           <p:cNvPr id="6" name="Рисунок 5">
             <a:extLst>
               <a:ext uri="{FF2B5EF4-FFF2-40B4-BE49-F238E27FC236}">
-                <a16:creationId xmlns:a16="http://schemas.microsoft.com/office/drawing/2014/main" id="{FF2FCD40-9FBC-486D-8614-26502494FDA1}"/>
+                <a16:creationId xmlns:a16="http://schemas.microsoft.com/office/drawing/2014/main" xmlns="" id="{FF2FCD40-9FBC-486D-8614-26502494FDA1}"/>
               </a:ext>
             </a:extLst>
           </p:cNvPr>
@@ -6232,7 +6647,7 @@
           <p:cNvPr id="1026" name="Picture 2">
             <a:extLst>
               <a:ext uri="{FF2B5EF4-FFF2-40B4-BE49-F238E27FC236}">
-                <a16:creationId xmlns:a16="http://schemas.microsoft.com/office/drawing/2014/main" id="{1853E300-D2AB-4D1B-9D00-064856279FD2}"/>
+                <a16:creationId xmlns:a16="http://schemas.microsoft.com/office/drawing/2014/main" xmlns="" id="{1853E300-D2AB-4D1B-9D00-064856279FD2}"/>
               </a:ext>
             </a:extLst>
           </p:cNvPr>
@@ -6274,305 +6689,10 @@
           </a:extLst>
         </p:spPr>
       </p:pic>
-      <p:pic>
-        <p:nvPicPr>
-          <p:cNvPr id="5" name="Рисунок 4">
-            <a:extLst>
-              <a:ext uri="{FF2B5EF4-FFF2-40B4-BE49-F238E27FC236}">
-                <a16:creationId xmlns:a16="http://schemas.microsoft.com/office/drawing/2014/main" id="{9D0584F9-1D52-43A7-8272-0E508219E023}"/>
-              </a:ext>
-            </a:extLst>
-          </p:cNvPr>
-          <p:cNvPicPr>
-            <a:picLocks noChangeAspect="1"/>
-          </p:cNvPicPr>
-          <p:nvPr/>
-        </p:nvPicPr>
-        <p:blipFill>
-          <a:blip r:embed="rId4"/>
-          <a:srcRect/>
-          <a:stretch/>
-        </p:blipFill>
-        <p:spPr>
-          <a:xfrm>
-            <a:off x="1253082" y="1568741"/>
-            <a:ext cx="8846428" cy="4937720"/>
-          </a:xfrm>
-          <a:prstGeom prst="rect">
-            <a:avLst/>
-          </a:prstGeom>
-        </p:spPr>
-      </p:pic>
-      <p:sp>
-        <p:nvSpPr>
-          <p:cNvPr id="7" name="Подзаголовок 2">
-            <a:extLst>
-              <a:ext uri="{FF2B5EF4-FFF2-40B4-BE49-F238E27FC236}">
-                <a16:creationId xmlns:a16="http://schemas.microsoft.com/office/drawing/2014/main" id="{FAF3B0AF-D443-465C-ABCE-522E5EEB244D}"/>
-              </a:ext>
-            </a:extLst>
-          </p:cNvPr>
-          <p:cNvSpPr txBox="1">
-            <a:spLocks/>
-          </p:cNvSpPr>
-          <p:nvPr/>
-        </p:nvSpPr>
-        <p:spPr>
-          <a:xfrm>
-            <a:off x="1162605" y="673216"/>
-            <a:ext cx="1756764" cy="669024"/>
-          </a:xfrm>
-          <a:prstGeom prst="rect">
-            <a:avLst/>
-          </a:prstGeom>
-        </p:spPr>
-        <p:txBody>
-          <a:bodyPr vert="horz" lIns="91440" tIns="45720" rIns="91440" bIns="45720" rtlCol="0" anchor="t">
-            <a:normAutofit/>
-          </a:bodyPr>
-          <a:lstStyle>
-            <a:lvl1pPr marL="0" indent="0" algn="l" defTabSz="457200" rtl="0" eaLnBrk="1" latinLnBrk="0" hangingPunct="1">
-              <a:spcBef>
-                <a:spcPct val="20000"/>
-              </a:spcBef>
-              <a:spcAft>
-                <a:spcPts val="600"/>
-              </a:spcAft>
-              <a:buClr>
-                <a:schemeClr val="tx1"/>
-              </a:buClr>
-              <a:buSzPct val="80000"/>
-              <a:buFont typeface="Wingdings 3" panose="05040102010807070707" pitchFamily="18" charset="2"/>
-              <a:buNone/>
-              <a:defRPr sz="2100" kern="1200" cap="none">
-                <a:solidFill>
-                  <a:schemeClr val="bg2">
-                    <a:lumMod val="75000"/>
-                  </a:schemeClr>
-                </a:solidFill>
-                <a:effectLst/>
-                <a:latin typeface="+mn-lt"/>
-                <a:ea typeface="+mn-ea"/>
-                <a:cs typeface="+mn-cs"/>
-              </a:defRPr>
-            </a:lvl1pPr>
-            <a:lvl2pPr marL="457200" indent="0" algn="ctr" defTabSz="457200" rtl="0" eaLnBrk="1" latinLnBrk="0" hangingPunct="1">
-              <a:spcBef>
-                <a:spcPct val="20000"/>
-              </a:spcBef>
-              <a:spcAft>
-                <a:spcPts val="600"/>
-              </a:spcAft>
-              <a:buClr>
-                <a:schemeClr val="tx1"/>
-              </a:buClr>
-              <a:buSzPct val="80000"/>
-              <a:buFont typeface="Wingdings 3" panose="05040102010807070707" pitchFamily="18" charset="2"/>
-              <a:buNone/>
-              <a:defRPr sz="1800" kern="1200" cap="none">
-                <a:solidFill>
-                  <a:schemeClr val="tx1">
-                    <a:tint val="75000"/>
-                  </a:schemeClr>
-                </a:solidFill>
-                <a:effectLst/>
-                <a:latin typeface="+mn-lt"/>
-                <a:ea typeface="+mn-ea"/>
-                <a:cs typeface="+mn-cs"/>
-              </a:defRPr>
-            </a:lvl2pPr>
-            <a:lvl3pPr marL="914400" indent="0" algn="ctr" defTabSz="457200" rtl="0" eaLnBrk="1" latinLnBrk="0" hangingPunct="1">
-              <a:spcBef>
-                <a:spcPct val="20000"/>
-              </a:spcBef>
-              <a:spcAft>
-                <a:spcPts val="600"/>
-              </a:spcAft>
-              <a:buClr>
-                <a:schemeClr val="tx1"/>
-              </a:buClr>
-              <a:buSzPct val="80000"/>
-              <a:buFont typeface="Wingdings 3" panose="05040102010807070707" pitchFamily="18" charset="2"/>
-              <a:buNone/>
-              <a:defRPr sz="1600" kern="1200" cap="none">
-                <a:solidFill>
-                  <a:schemeClr val="tx1">
-                    <a:tint val="75000"/>
-                  </a:schemeClr>
-                </a:solidFill>
-                <a:effectLst/>
-                <a:latin typeface="+mn-lt"/>
-                <a:ea typeface="+mn-ea"/>
-                <a:cs typeface="+mn-cs"/>
-              </a:defRPr>
-            </a:lvl3pPr>
-            <a:lvl4pPr marL="1371600" indent="0" algn="ctr" defTabSz="457200" rtl="0" eaLnBrk="1" latinLnBrk="0" hangingPunct="1">
-              <a:spcBef>
-                <a:spcPct val="20000"/>
-              </a:spcBef>
-              <a:spcAft>
-                <a:spcPts val="600"/>
-              </a:spcAft>
-              <a:buClr>
-                <a:schemeClr val="tx1"/>
-              </a:buClr>
-              <a:buSzPct val="80000"/>
-              <a:buFont typeface="Wingdings 3" panose="05040102010807070707" pitchFamily="18" charset="2"/>
-              <a:buNone/>
-              <a:defRPr sz="1400" kern="1200" cap="none">
-                <a:solidFill>
-                  <a:schemeClr val="tx1">
-                    <a:tint val="75000"/>
-                  </a:schemeClr>
-                </a:solidFill>
-                <a:effectLst/>
-                <a:latin typeface="+mn-lt"/>
-                <a:ea typeface="+mn-ea"/>
-                <a:cs typeface="+mn-cs"/>
-              </a:defRPr>
-            </a:lvl4pPr>
-            <a:lvl5pPr marL="1828800" indent="0" algn="ctr" defTabSz="457200" rtl="0" eaLnBrk="1" latinLnBrk="0" hangingPunct="1">
-              <a:spcBef>
-                <a:spcPct val="20000"/>
-              </a:spcBef>
-              <a:spcAft>
-                <a:spcPts val="600"/>
-              </a:spcAft>
-              <a:buClr>
-                <a:schemeClr val="tx1"/>
-              </a:buClr>
-              <a:buSzPct val="80000"/>
-              <a:buFont typeface="Wingdings 3" panose="05040102010807070707" pitchFamily="18" charset="2"/>
-              <a:buNone/>
-              <a:defRPr sz="1400" kern="1200" cap="none">
-                <a:solidFill>
-                  <a:schemeClr val="tx1">
-                    <a:tint val="75000"/>
-                  </a:schemeClr>
-                </a:solidFill>
-                <a:effectLst/>
-                <a:latin typeface="+mn-lt"/>
-                <a:ea typeface="+mn-ea"/>
-                <a:cs typeface="+mn-cs"/>
-              </a:defRPr>
-            </a:lvl5pPr>
-            <a:lvl6pPr marL="2286000" indent="0" algn="ctr" defTabSz="457200" rtl="0" eaLnBrk="1" latinLnBrk="0" hangingPunct="1">
-              <a:spcBef>
-                <a:spcPct val="20000"/>
-              </a:spcBef>
-              <a:spcAft>
-                <a:spcPts val="600"/>
-              </a:spcAft>
-              <a:buClr>
-                <a:schemeClr val="tx1"/>
-              </a:buClr>
-              <a:buSzPct val="80000"/>
-              <a:buFont typeface="Wingdings 3" panose="05040102010807070707" pitchFamily="18" charset="2"/>
-              <a:buNone/>
-              <a:defRPr sz="1400" kern="1200" cap="none">
-                <a:solidFill>
-                  <a:schemeClr val="tx1">
-                    <a:tint val="75000"/>
-                  </a:schemeClr>
-                </a:solidFill>
-                <a:effectLst/>
-                <a:latin typeface="+mn-lt"/>
-                <a:ea typeface="+mn-ea"/>
-                <a:cs typeface="+mn-cs"/>
-              </a:defRPr>
-            </a:lvl6pPr>
-            <a:lvl7pPr marL="2743200" indent="0" algn="ctr" defTabSz="457200" rtl="0" eaLnBrk="1" latinLnBrk="0" hangingPunct="1">
-              <a:spcBef>
-                <a:spcPct val="20000"/>
-              </a:spcBef>
-              <a:spcAft>
-                <a:spcPts val="600"/>
-              </a:spcAft>
-              <a:buClr>
-                <a:schemeClr val="tx1"/>
-              </a:buClr>
-              <a:buSzPct val="80000"/>
-              <a:buFont typeface="Wingdings 3" panose="05040102010807070707" pitchFamily="18" charset="2"/>
-              <a:buNone/>
-              <a:defRPr sz="1400" kern="1200" cap="none">
-                <a:solidFill>
-                  <a:schemeClr val="tx1">
-                    <a:tint val="75000"/>
-                  </a:schemeClr>
-                </a:solidFill>
-                <a:effectLst/>
-                <a:latin typeface="+mn-lt"/>
-                <a:ea typeface="+mn-ea"/>
-                <a:cs typeface="+mn-cs"/>
-              </a:defRPr>
-            </a:lvl7pPr>
-            <a:lvl8pPr marL="3200400" indent="0" algn="ctr" defTabSz="457200" rtl="0" eaLnBrk="1" latinLnBrk="0" hangingPunct="1">
-              <a:spcBef>
-                <a:spcPct val="20000"/>
-              </a:spcBef>
-              <a:spcAft>
-                <a:spcPts val="600"/>
-              </a:spcAft>
-              <a:buClr>
-                <a:schemeClr val="tx1"/>
-              </a:buClr>
-              <a:buSzPct val="80000"/>
-              <a:buFont typeface="Wingdings 3" panose="05040102010807070707" pitchFamily="18" charset="2"/>
-              <a:buNone/>
-              <a:defRPr sz="1400" kern="1200" cap="none">
-                <a:solidFill>
-                  <a:schemeClr val="tx1">
-                    <a:tint val="75000"/>
-                  </a:schemeClr>
-                </a:solidFill>
-                <a:effectLst/>
-                <a:latin typeface="+mn-lt"/>
-                <a:ea typeface="+mn-ea"/>
-                <a:cs typeface="+mn-cs"/>
-              </a:defRPr>
-            </a:lvl8pPr>
-            <a:lvl9pPr marL="3657600" indent="0" algn="ctr" defTabSz="457200" rtl="0" eaLnBrk="1" latinLnBrk="0" hangingPunct="1">
-              <a:spcBef>
-                <a:spcPct val="20000"/>
-              </a:spcBef>
-              <a:spcAft>
-                <a:spcPts val="600"/>
-              </a:spcAft>
-              <a:buClr>
-                <a:schemeClr val="tx1"/>
-              </a:buClr>
-              <a:buSzPct val="80000"/>
-              <a:buFont typeface="Wingdings 3" panose="05040102010807070707" pitchFamily="18" charset="2"/>
-              <a:buNone/>
-              <a:defRPr sz="1400" kern="1200" cap="none">
-                <a:solidFill>
-                  <a:schemeClr val="tx1">
-                    <a:tint val="75000"/>
-                  </a:schemeClr>
-                </a:solidFill>
-                <a:effectLst/>
-                <a:latin typeface="+mn-lt"/>
-                <a:ea typeface="+mn-ea"/>
-                <a:cs typeface="+mn-cs"/>
-              </a:defRPr>
-            </a:lvl9pPr>
-          </a:lstStyle>
-          <a:p>
-            <a:r>
-              <a:rPr lang="ru-RU" b="1" dirty="0">
-                <a:solidFill>
-                  <a:schemeClr val="tx1"/>
-                </a:solidFill>
-              </a:rPr>
-              <a:t>(монолит)</a:t>
-            </a:r>
-          </a:p>
-        </p:txBody>
-      </p:sp>
     </p:spTree>
     <p:extLst>
       <p:ext uri="{BB962C8B-B14F-4D97-AF65-F5344CB8AC3E}">
-        <p14:creationId xmlns:p14="http://schemas.microsoft.com/office/powerpoint/2010/main" val="2589671466"/>
+        <p14:creationId xmlns:p14="http://schemas.microsoft.com/office/powerpoint/2010/main" val="1484163686"/>
       </p:ext>
     </p:extLst>
   </p:cSld>
@@ -6604,7 +6724,7 @@
           <p:cNvPr id="2" name="Заголовок 1">
             <a:extLst>
               <a:ext uri="{FF2B5EF4-FFF2-40B4-BE49-F238E27FC236}">
-                <a16:creationId xmlns:a16="http://schemas.microsoft.com/office/drawing/2014/main" id="{4EE3562E-5A77-439A-9C54-43C6C57D7DA4}"/>
+                <a16:creationId xmlns:a16="http://schemas.microsoft.com/office/drawing/2014/main" xmlns="" id="{4EE3562E-5A77-439A-9C54-43C6C57D7DA4}"/>
               </a:ext>
             </a:extLst>
           </p:cNvPr>
@@ -6639,7 +6759,7 @@
           <p:cNvPr id="3" name="Подзаголовок 2">
             <a:extLst>
               <a:ext uri="{FF2B5EF4-FFF2-40B4-BE49-F238E27FC236}">
-                <a16:creationId xmlns:a16="http://schemas.microsoft.com/office/drawing/2014/main" id="{B9317856-7FF1-4C87-A96B-E80A7856A25C}"/>
+                <a16:creationId xmlns:a16="http://schemas.microsoft.com/office/drawing/2014/main" xmlns="" id="{B9317856-7FF1-4C87-A96B-E80A7856A25C}"/>
               </a:ext>
             </a:extLst>
           </p:cNvPr>
@@ -6652,174 +6772,83 @@
         </p:nvSpPr>
         <p:spPr>
           <a:xfrm>
-            <a:off x="404188" y="1132514"/>
-            <a:ext cx="9108928" cy="4437776"/>
+            <a:off x="344367" y="808371"/>
+            <a:ext cx="11312096" cy="1320129"/>
           </a:xfrm>
         </p:spPr>
         <p:txBody>
           <a:bodyPr>
-            <a:normAutofit lnSpcReduction="10000"/>
+            <a:normAutofit/>
           </a:bodyPr>
           <a:lstStyle/>
           <a:p>
+            <a:pPr algn="ctr">
+              <a:spcBef>
+                <a:spcPts val="0"/>
+              </a:spcBef>
+              <a:spcAft>
+                <a:spcPts val="0"/>
+              </a:spcAft>
+            </a:pPr>
             <a:r>
               <a:rPr lang="ru-RU" b="1" dirty="0"/>
-              <a:t>Использованные паттерны проектирования:</a:t>
-            </a:r>
-          </a:p>
-          <a:p>
-            <a:pPr marL="342900" indent="-342900">
-              <a:buFontTx/>
-              <a:buChar char="-"/>
+              <a:t>Пример дерева классов для </a:t>
+            </a:r>
+            <a:r>
+              <a:rPr lang="en-US" b="1" dirty="0" err="1"/>
+              <a:t>handler_message</a:t>
+            </a:r>
+            <a:r>
+              <a:rPr lang="en-US" b="1" dirty="0"/>
+              <a:t> </a:t>
+            </a:r>
+          </a:p>
+          <a:p>
+            <a:pPr algn="ctr">
+              <a:spcBef>
+                <a:spcPts val="0"/>
+              </a:spcBef>
+              <a:spcAft>
+                <a:spcPts val="0"/>
+              </a:spcAft>
             </a:pPr>
             <a:r>
-              <a:rPr lang="ru-RU" dirty="0"/>
-              <a:t>абстрактная фабрика (</a:t>
-            </a:r>
-            <a:r>
-              <a:rPr lang="en-US" dirty="0"/>
-              <a:t>main)</a:t>
-            </a:r>
-            <a:r>
-              <a:rPr lang="ru-RU" dirty="0"/>
-              <a:t>;</a:t>
-            </a:r>
-          </a:p>
-          <a:p>
-            <a:pPr marL="342900" indent="-342900">
-              <a:buFontTx/>
-              <a:buChar char="-"/>
-            </a:pPr>
-            <a:r>
-              <a:rPr lang="ru-RU" dirty="0"/>
-              <a:t>фабричный метод</a:t>
-            </a:r>
-            <a:r>
-              <a:rPr lang="en-US" dirty="0"/>
-              <a:t> (</a:t>
-            </a:r>
-            <a:r>
-              <a:rPr lang="en-US" dirty="0" err="1"/>
-              <a:t>handler_message</a:t>
-            </a:r>
-            <a:r>
-              <a:rPr lang="en-US" dirty="0"/>
+              <a:rPr lang="en-US" b="1" dirty="0"/>
+              <a:t>(</a:t>
+            </a:r>
+            <a:r>
+              <a:rPr lang="ru-RU" b="1" dirty="0"/>
+              <a:t>обработчики, отвечающие за команды </a:t>
+            </a:r>
+            <a:r>
+              <a:rPr lang="en-US" b="1" dirty="0" err="1"/>
+              <a:t>lowprice</a:t>
+            </a:r>
+            <a:r>
+              <a:rPr lang="en-US" b="1" dirty="0"/>
               <a:t>, </a:t>
             </a:r>
             <a:r>
-              <a:rPr lang="en-US" dirty="0" err="1"/>
-              <a:t>command_message</a:t>
-            </a:r>
-            <a:r>
-              <a:rPr lang="en-US" dirty="0"/>
+              <a:rPr lang="en-US" b="1" dirty="0" err="1"/>
+              <a:t>highprice</a:t>
+            </a:r>
+            <a:r>
+              <a:rPr lang="en-US" b="1" dirty="0"/>
+              <a:t> </a:t>
+            </a:r>
+            <a:r>
+              <a:rPr lang="ru-RU" b="1" dirty="0"/>
+              <a:t>и </a:t>
+            </a:r>
+            <a:r>
+              <a:rPr lang="en-US" b="1" dirty="0" err="1"/>
+              <a:t>bestdeal</a:t>
+            </a:r>
+            <a:r>
+              <a:rPr lang="en-US" b="1" dirty="0"/>
               <a:t>)</a:t>
             </a:r>
-            <a:r>
-              <a:rPr lang="ru-RU" dirty="0"/>
-              <a:t>;</a:t>
-            </a:r>
-          </a:p>
-          <a:p>
-            <a:pPr marL="342900" indent="-342900">
-              <a:buFontTx/>
-              <a:buChar char="-"/>
-            </a:pPr>
-            <a:r>
-              <a:rPr lang="ru-RU" dirty="0"/>
-              <a:t>одиночка</a:t>
-            </a:r>
-            <a:r>
-              <a:rPr lang="en-US" dirty="0"/>
-              <a:t> (registry)</a:t>
-            </a:r>
-            <a:r>
-              <a:rPr lang="ru-RU" dirty="0"/>
-              <a:t>;</a:t>
-            </a:r>
-          </a:p>
-          <a:p>
-            <a:pPr marL="342900" indent="-342900">
-              <a:buFontTx/>
-              <a:buChar char="-"/>
-            </a:pPr>
-            <a:r>
-              <a:rPr lang="ru-RU" dirty="0"/>
-              <a:t>фасад</a:t>
-            </a:r>
-            <a:r>
-              <a:rPr lang="en-US" dirty="0"/>
-              <a:t> (rapid – </a:t>
-            </a:r>
-            <a:r>
-              <a:rPr lang="ru-RU" dirty="0"/>
-              <a:t>внешний интерфейс);</a:t>
-            </a:r>
-          </a:p>
-          <a:p>
-            <a:pPr marL="342900" indent="-342900">
-              <a:buFontTx/>
-              <a:buChar char="-"/>
-            </a:pPr>
-            <a:r>
-              <a:rPr lang="ru-RU" dirty="0"/>
-              <a:t>строитель (</a:t>
-            </a:r>
-            <a:r>
-              <a:rPr lang="en-US" dirty="0"/>
-              <a:t>conversation)</a:t>
-            </a:r>
-            <a:r>
-              <a:rPr lang="ru-RU" dirty="0"/>
-              <a:t>;</a:t>
-            </a:r>
-          </a:p>
-          <a:p>
-            <a:pPr marL="342900" indent="-342900">
-              <a:buFontTx/>
-              <a:buChar char="-"/>
-            </a:pPr>
-            <a:r>
-              <a:rPr lang="ru-RU" dirty="0"/>
-              <a:t>стратегия</a:t>
-            </a:r>
-            <a:r>
-              <a:rPr lang="en-US" dirty="0"/>
-              <a:t> (</a:t>
-            </a:r>
-            <a:r>
-              <a:rPr lang="en-US" dirty="0" err="1"/>
-              <a:t>db</a:t>
-            </a:r>
-            <a:r>
-              <a:rPr lang="en-US" dirty="0"/>
-              <a:t>)</a:t>
-            </a:r>
-            <a:endParaRPr lang="ru-RU" dirty="0"/>
-          </a:p>
-          <a:p>
-            <a:endParaRPr lang="ru-RU" dirty="0"/>
-          </a:p>
-          <a:p>
-            <a:r>
-              <a:rPr lang="ru-RU" b="1" dirty="0"/>
-              <a:t>Использованные архитектурные паттерны:</a:t>
-            </a:r>
-            <a:endParaRPr lang="ru-RU" dirty="0"/>
-          </a:p>
-          <a:p>
-            <a:pPr marL="342900" indent="-342900">
-              <a:buFontTx/>
-              <a:buChar char="-"/>
-            </a:pPr>
-            <a:r>
-              <a:rPr lang="ru-RU" dirty="0"/>
-              <a:t>реестр </a:t>
-            </a:r>
-            <a:r>
-              <a:rPr lang="en-US" dirty="0"/>
-              <a:t>(registry)</a:t>
-            </a:r>
-            <a:endParaRPr lang="ru-RU" dirty="0"/>
+            <a:endParaRPr lang="ru-RU" b="1" dirty="0"/>
           </a:p>
         </p:txBody>
       </p:sp>
@@ -6828,7 +6857,7 @@
           <p:cNvPr id="6" name="Рисунок 5">
             <a:extLst>
               <a:ext uri="{FF2B5EF4-FFF2-40B4-BE49-F238E27FC236}">
-                <a16:creationId xmlns:a16="http://schemas.microsoft.com/office/drawing/2014/main" id="{FF2FCD40-9FBC-486D-8614-26502494FDA1}"/>
+                <a16:creationId xmlns:a16="http://schemas.microsoft.com/office/drawing/2014/main" xmlns="" id="{FF2FCD40-9FBC-486D-8614-26502494FDA1}"/>
               </a:ext>
             </a:extLst>
           </p:cNvPr>
@@ -6858,7 +6887,7 @@
           <p:cNvPr id="1026" name="Picture 2">
             <a:extLst>
               <a:ext uri="{FF2B5EF4-FFF2-40B4-BE49-F238E27FC236}">
-                <a16:creationId xmlns:a16="http://schemas.microsoft.com/office/drawing/2014/main" id="{1853E300-D2AB-4D1B-9D00-064856279FD2}"/>
+                <a16:creationId xmlns:a16="http://schemas.microsoft.com/office/drawing/2014/main" xmlns="" id="{1853E300-D2AB-4D1B-9D00-064856279FD2}"/>
               </a:ext>
             </a:extLst>
           </p:cNvPr>
@@ -6900,252 +6929,12 @@
           </a:extLst>
         </p:spPr>
       </p:pic>
-    </p:spTree>
-    <p:extLst>
-      <p:ext uri="{BB962C8B-B14F-4D97-AF65-F5344CB8AC3E}">
-        <p14:creationId xmlns:p14="http://schemas.microsoft.com/office/powerpoint/2010/main" val="1484163686"/>
-      </p:ext>
-    </p:extLst>
-  </p:cSld>
-  <p:clrMapOvr>
-    <a:masterClrMapping/>
-  </p:clrMapOvr>
-</p:sld>
-</file>
-
-<file path=ppt/slides/slide6.xml><?xml version="1.0" encoding="utf-8"?>
-<p:sld xmlns:a="http://schemas.openxmlformats.org/drawingml/2006/main" xmlns:r="http://schemas.openxmlformats.org/officeDocument/2006/relationships" xmlns:p="http://schemas.openxmlformats.org/presentationml/2006/main">
-  <p:cSld>
-    <p:spTree>
-      <p:nvGrpSpPr>
-        <p:cNvPr id="1" name=""/>
-        <p:cNvGrpSpPr/>
-        <p:nvPr/>
-      </p:nvGrpSpPr>
-      <p:grpSpPr>
-        <a:xfrm>
-          <a:off x="0" y="0"/>
-          <a:ext cx="0" cy="0"/>
-          <a:chOff x="0" y="0"/>
-          <a:chExt cx="0" cy="0"/>
-        </a:xfrm>
-      </p:grpSpPr>
-      <p:sp>
-        <p:nvSpPr>
-          <p:cNvPr id="2" name="Заголовок 1">
-            <a:extLst>
-              <a:ext uri="{FF2B5EF4-FFF2-40B4-BE49-F238E27FC236}">
-                <a16:creationId xmlns:a16="http://schemas.microsoft.com/office/drawing/2014/main" id="{4EE3562E-5A77-439A-9C54-43C6C57D7DA4}"/>
-              </a:ext>
-            </a:extLst>
-          </p:cNvPr>
-          <p:cNvSpPr>
-            <a:spLocks noGrp="1"/>
-          </p:cNvSpPr>
-          <p:nvPr>
-            <p:ph type="ctrTitle"/>
-          </p:nvPr>
-        </p:nvSpPr>
-        <p:spPr>
-          <a:xfrm>
-            <a:off x="172483" y="0"/>
-            <a:ext cx="4701521" cy="788565"/>
-          </a:xfrm>
-        </p:spPr>
-        <p:txBody>
-          <a:bodyPr>
-            <a:normAutofit fontScale="90000"/>
-          </a:bodyPr>
-          <a:lstStyle/>
-          <a:p>
-            <a:r>
-              <a:rPr lang="ru-RU" dirty="0"/>
-              <a:t>Архитектура</a:t>
-            </a:r>
-          </a:p>
-        </p:txBody>
-      </p:sp>
-      <p:sp>
-        <p:nvSpPr>
-          <p:cNvPr id="3" name="Подзаголовок 2">
-            <a:extLst>
-              <a:ext uri="{FF2B5EF4-FFF2-40B4-BE49-F238E27FC236}">
-                <a16:creationId xmlns:a16="http://schemas.microsoft.com/office/drawing/2014/main" id="{B9317856-7FF1-4C87-A96B-E80A7856A25C}"/>
-              </a:ext>
-            </a:extLst>
-          </p:cNvPr>
-          <p:cNvSpPr>
-            <a:spLocks noGrp="1"/>
-          </p:cNvSpPr>
-          <p:nvPr>
-            <p:ph type="subTitle" idx="1"/>
-          </p:nvPr>
-        </p:nvSpPr>
-        <p:spPr>
-          <a:xfrm>
-            <a:off x="344367" y="808371"/>
-            <a:ext cx="11312096" cy="1320129"/>
-          </a:xfrm>
-        </p:spPr>
-        <p:txBody>
-          <a:bodyPr>
-            <a:normAutofit/>
-          </a:bodyPr>
-          <a:lstStyle/>
-          <a:p>
-            <a:pPr algn="ctr">
-              <a:spcBef>
-                <a:spcPts val="0"/>
-              </a:spcBef>
-              <a:spcAft>
-                <a:spcPts val="0"/>
-              </a:spcAft>
-            </a:pPr>
-            <a:r>
-              <a:rPr lang="ru-RU" b="1" dirty="0"/>
-              <a:t>Пример дерева классов для </a:t>
-            </a:r>
-            <a:r>
-              <a:rPr lang="en-US" b="1" dirty="0" err="1"/>
-              <a:t>handler_message</a:t>
-            </a:r>
-            <a:r>
-              <a:rPr lang="en-US" b="1" dirty="0"/>
-              <a:t> </a:t>
-            </a:r>
-          </a:p>
-          <a:p>
-            <a:pPr algn="ctr">
-              <a:spcBef>
-                <a:spcPts val="0"/>
-              </a:spcBef>
-              <a:spcAft>
-                <a:spcPts val="0"/>
-              </a:spcAft>
-            </a:pPr>
-            <a:r>
-              <a:rPr lang="en-US" b="1" dirty="0"/>
-              <a:t>(</a:t>
-            </a:r>
-            <a:r>
-              <a:rPr lang="ru-RU" b="1" dirty="0"/>
-              <a:t>обработчики, отвечающие за команды </a:t>
-            </a:r>
-            <a:r>
-              <a:rPr lang="en-US" b="1" dirty="0" err="1"/>
-              <a:t>lowprice</a:t>
-            </a:r>
-            <a:r>
-              <a:rPr lang="en-US" b="1" dirty="0"/>
-              <a:t>, </a:t>
-            </a:r>
-            <a:r>
-              <a:rPr lang="en-US" b="1" dirty="0" err="1"/>
-              <a:t>highprice</a:t>
-            </a:r>
-            <a:r>
-              <a:rPr lang="en-US" b="1" dirty="0"/>
-              <a:t> </a:t>
-            </a:r>
-            <a:r>
-              <a:rPr lang="ru-RU" b="1" dirty="0"/>
-              <a:t>и </a:t>
-            </a:r>
-            <a:r>
-              <a:rPr lang="en-US" b="1" dirty="0" err="1"/>
-              <a:t>bestdeal</a:t>
-            </a:r>
-            <a:r>
-              <a:rPr lang="en-US" b="1" dirty="0"/>
-              <a:t>)</a:t>
-            </a:r>
-            <a:endParaRPr lang="ru-RU" b="1" dirty="0"/>
-          </a:p>
-        </p:txBody>
-      </p:sp>
-      <p:pic>
-        <p:nvPicPr>
-          <p:cNvPr id="6" name="Рисунок 5">
-            <a:extLst>
-              <a:ext uri="{FF2B5EF4-FFF2-40B4-BE49-F238E27FC236}">
-                <a16:creationId xmlns:a16="http://schemas.microsoft.com/office/drawing/2014/main" id="{FF2FCD40-9FBC-486D-8614-26502494FDA1}"/>
-              </a:ext>
-            </a:extLst>
-          </p:cNvPr>
-          <p:cNvPicPr>
-            <a:picLocks noChangeAspect="1"/>
-          </p:cNvPicPr>
-          <p:nvPr/>
-        </p:nvPicPr>
-        <p:blipFill>
-          <a:blip r:embed="rId2"/>
-          <a:stretch>
-            <a:fillRect/>
-          </a:stretch>
-        </p:blipFill>
-        <p:spPr>
-          <a:xfrm>
-            <a:off x="10645629" y="5656487"/>
-            <a:ext cx="1546371" cy="1201513"/>
-          </a:xfrm>
-          <a:prstGeom prst="rect">
-            <a:avLst/>
-          </a:prstGeom>
-        </p:spPr>
-      </p:pic>
-      <p:pic>
-        <p:nvPicPr>
-          <p:cNvPr id="1026" name="Picture 2">
-            <a:extLst>
-              <a:ext uri="{FF2B5EF4-FFF2-40B4-BE49-F238E27FC236}">
-                <a16:creationId xmlns:a16="http://schemas.microsoft.com/office/drawing/2014/main" id="{1853E300-D2AB-4D1B-9D00-064856279FD2}"/>
-              </a:ext>
-            </a:extLst>
-          </p:cNvPr>
-          <p:cNvPicPr>
-            <a:picLocks noChangeAspect="1" noChangeArrowheads="1"/>
-          </p:cNvPicPr>
-          <p:nvPr/>
-        </p:nvPicPr>
-        <p:blipFill>
-          <a:blip r:embed="rId3">
-            <a:extLst>
-              <a:ext uri="{28A0092B-C50C-407E-A947-70E740481C1C}">
-                <a14:useLocalDpi xmlns:a14="http://schemas.microsoft.com/office/drawing/2010/main" val="0"/>
-              </a:ext>
-            </a:extLst>
-          </a:blip>
-          <a:srcRect/>
-          <a:stretch>
-            <a:fillRect/>
-          </a:stretch>
-        </p:blipFill>
-        <p:spPr bwMode="auto">
-          <a:xfrm>
-            <a:off x="10645629" y="-186656"/>
-            <a:ext cx="1475230" cy="872455"/>
-          </a:xfrm>
-          <a:prstGeom prst="rect">
-            <a:avLst/>
-          </a:prstGeom>
-          <a:noFill/>
-          <a:extLst>
-            <a:ext uri="{909E8E84-426E-40DD-AFC4-6F175D3DCCD1}">
-              <a14:hiddenFill xmlns:a14="http://schemas.microsoft.com/office/drawing/2010/main">
-                <a:solidFill>
-                  <a:srgbClr val="FFFFFF"/>
-                </a:solidFill>
-              </a14:hiddenFill>
-            </a:ext>
-          </a:extLst>
-        </p:spPr>
-      </p:pic>
       <p:pic>
         <p:nvPicPr>
           <p:cNvPr id="8" name="Рисунок 7">
             <a:extLst>
               <a:ext uri="{FF2B5EF4-FFF2-40B4-BE49-F238E27FC236}">
-                <a16:creationId xmlns:a16="http://schemas.microsoft.com/office/drawing/2014/main" id="{2E3E0824-1F07-49C1-A391-13BBEB437099}"/>
+                <a16:creationId xmlns:a16="http://schemas.microsoft.com/office/drawing/2014/main" xmlns="" id="{2E3E0824-1F07-49C1-A391-13BBEB437099}"/>
               </a:ext>
             </a:extLst>
           </p:cNvPr>
@@ -7174,738 +6963,6 @@
     <p:extLst>
       <p:ext uri="{BB962C8B-B14F-4D97-AF65-F5344CB8AC3E}">
         <p14:creationId xmlns:p14="http://schemas.microsoft.com/office/powerpoint/2010/main" val="1282952593"/>
-      </p:ext>
-    </p:extLst>
-  </p:cSld>
-  <p:clrMapOvr>
-    <a:masterClrMapping/>
-  </p:clrMapOvr>
-</p:sld>
-</file>
-
-<file path=ppt/slides/slide7.xml><?xml version="1.0" encoding="utf-8"?>
-<p:sld xmlns:a="http://schemas.openxmlformats.org/drawingml/2006/main" xmlns:r="http://schemas.openxmlformats.org/officeDocument/2006/relationships" xmlns:p="http://schemas.openxmlformats.org/presentationml/2006/main">
-  <p:cSld>
-    <p:spTree>
-      <p:nvGrpSpPr>
-        <p:cNvPr id="1" name=""/>
-        <p:cNvGrpSpPr/>
-        <p:nvPr/>
-      </p:nvGrpSpPr>
-      <p:grpSpPr>
-        <a:xfrm>
-          <a:off x="0" y="0"/>
-          <a:ext cx="0" cy="0"/>
-          <a:chOff x="0" y="0"/>
-          <a:chExt cx="0" cy="0"/>
-        </a:xfrm>
-      </p:grpSpPr>
-      <p:sp>
-        <p:nvSpPr>
-          <p:cNvPr id="2" name="Заголовок 1">
-            <a:extLst>
-              <a:ext uri="{FF2B5EF4-FFF2-40B4-BE49-F238E27FC236}">
-                <a16:creationId xmlns:a16="http://schemas.microsoft.com/office/drawing/2014/main" id="{4EE3562E-5A77-439A-9C54-43C6C57D7DA4}"/>
-              </a:ext>
-            </a:extLst>
-          </p:cNvPr>
-          <p:cNvSpPr>
-            <a:spLocks noGrp="1"/>
-          </p:cNvSpPr>
-          <p:nvPr>
-            <p:ph type="ctrTitle"/>
-          </p:nvPr>
-        </p:nvSpPr>
-        <p:spPr>
-          <a:xfrm>
-            <a:off x="591931" y="249571"/>
-            <a:ext cx="7578945" cy="788565"/>
-          </a:xfrm>
-        </p:spPr>
-        <p:txBody>
-          <a:bodyPr>
-            <a:normAutofit fontScale="90000"/>
-          </a:bodyPr>
-          <a:lstStyle/>
-          <a:p>
-            <a:r>
-              <a:rPr lang="ru-RU" dirty="0"/>
-              <a:t>трудности</a:t>
-            </a:r>
-          </a:p>
-        </p:txBody>
-      </p:sp>
-      <p:sp>
-        <p:nvSpPr>
-          <p:cNvPr id="3" name="Подзаголовок 2">
-            <a:extLst>
-              <a:ext uri="{FF2B5EF4-FFF2-40B4-BE49-F238E27FC236}">
-                <a16:creationId xmlns:a16="http://schemas.microsoft.com/office/drawing/2014/main" id="{B9317856-7FF1-4C87-A96B-E80A7856A25C}"/>
-              </a:ext>
-            </a:extLst>
-          </p:cNvPr>
-          <p:cNvSpPr>
-            <a:spLocks noGrp="1"/>
-          </p:cNvSpPr>
-          <p:nvPr>
-            <p:ph type="subTitle" idx="1"/>
-          </p:nvPr>
-        </p:nvSpPr>
-        <p:spPr>
-          <a:xfrm>
-            <a:off x="591931" y="1331363"/>
-            <a:ext cx="7981618" cy="1209258"/>
-          </a:xfrm>
-        </p:spPr>
-        <p:txBody>
-          <a:bodyPr>
-            <a:normAutofit/>
-          </a:bodyPr>
-          <a:lstStyle/>
-          <a:p>
-            <a:r>
-              <a:rPr lang="ru-RU" dirty="0"/>
-              <a:t>«Переключение» на парадигму ООП после структурного и функционального стиля программирования</a:t>
-            </a:r>
-          </a:p>
-          <a:p>
-            <a:endParaRPr lang="en-US" dirty="0"/>
-          </a:p>
-          <a:p>
-            <a:endParaRPr lang="ru-RU" dirty="0"/>
-          </a:p>
-        </p:txBody>
-      </p:sp>
-      <p:pic>
-        <p:nvPicPr>
-          <p:cNvPr id="6" name="Рисунок 5">
-            <a:extLst>
-              <a:ext uri="{FF2B5EF4-FFF2-40B4-BE49-F238E27FC236}">
-                <a16:creationId xmlns:a16="http://schemas.microsoft.com/office/drawing/2014/main" id="{FF2FCD40-9FBC-486D-8614-26502494FDA1}"/>
-              </a:ext>
-            </a:extLst>
-          </p:cNvPr>
-          <p:cNvPicPr>
-            <a:picLocks noChangeAspect="1"/>
-          </p:cNvPicPr>
-          <p:nvPr/>
-        </p:nvPicPr>
-        <p:blipFill>
-          <a:blip r:embed="rId2"/>
-          <a:stretch>
-            <a:fillRect/>
-          </a:stretch>
-        </p:blipFill>
-        <p:spPr>
-          <a:xfrm>
-            <a:off x="10645629" y="5656487"/>
-            <a:ext cx="1546371" cy="1201513"/>
-          </a:xfrm>
-          <a:prstGeom prst="rect">
-            <a:avLst/>
-          </a:prstGeom>
-        </p:spPr>
-      </p:pic>
-      <p:pic>
-        <p:nvPicPr>
-          <p:cNvPr id="1026" name="Picture 2">
-            <a:extLst>
-              <a:ext uri="{FF2B5EF4-FFF2-40B4-BE49-F238E27FC236}">
-                <a16:creationId xmlns:a16="http://schemas.microsoft.com/office/drawing/2014/main" id="{1853E300-D2AB-4D1B-9D00-064856279FD2}"/>
-              </a:ext>
-            </a:extLst>
-          </p:cNvPr>
-          <p:cNvPicPr>
-            <a:picLocks noChangeAspect="1" noChangeArrowheads="1"/>
-          </p:cNvPicPr>
-          <p:nvPr/>
-        </p:nvPicPr>
-        <p:blipFill>
-          <a:blip r:embed="rId3">
-            <a:extLst>
-              <a:ext uri="{28A0092B-C50C-407E-A947-70E740481C1C}">
-                <a14:useLocalDpi xmlns:a14="http://schemas.microsoft.com/office/drawing/2010/main" val="0"/>
-              </a:ext>
-            </a:extLst>
-          </a:blip>
-          <a:srcRect/>
-          <a:stretch>
-            <a:fillRect/>
-          </a:stretch>
-        </p:blipFill>
-        <p:spPr bwMode="auto">
-          <a:xfrm>
-            <a:off x="10645629" y="-186656"/>
-            <a:ext cx="1475230" cy="872455"/>
-          </a:xfrm>
-          <a:prstGeom prst="rect">
-            <a:avLst/>
-          </a:prstGeom>
-          <a:noFill/>
-          <a:extLst>
-            <a:ext uri="{909E8E84-426E-40DD-AFC4-6F175D3DCCD1}">
-              <a14:hiddenFill xmlns:a14="http://schemas.microsoft.com/office/drawing/2010/main">
-                <a:solidFill>
-                  <a:srgbClr val="FFFFFF"/>
-                </a:solidFill>
-              </a14:hiddenFill>
-            </a:ext>
-          </a:extLst>
-        </p:spPr>
-      </p:pic>
-      <p:sp>
-        <p:nvSpPr>
-          <p:cNvPr id="7" name="Заголовок 1">
-            <a:extLst>
-              <a:ext uri="{FF2B5EF4-FFF2-40B4-BE49-F238E27FC236}">
-                <a16:creationId xmlns:a16="http://schemas.microsoft.com/office/drawing/2014/main" id="{12F814DC-3326-4781-8E45-F02C8AC78F80}"/>
-              </a:ext>
-            </a:extLst>
-          </p:cNvPr>
-          <p:cNvSpPr txBox="1">
-            <a:spLocks/>
-          </p:cNvSpPr>
-          <p:nvPr/>
-        </p:nvSpPr>
-        <p:spPr>
-          <a:xfrm>
-            <a:off x="484272" y="2759277"/>
-            <a:ext cx="7578945" cy="788565"/>
-          </a:xfrm>
-          <a:prstGeom prst="rect">
-            <a:avLst/>
-          </a:prstGeom>
-          <a:effectLst/>
-        </p:spPr>
-        <p:txBody>
-          <a:bodyPr vert="horz" lIns="91440" tIns="45720" rIns="91440" bIns="45720" rtlCol="0" anchor="b">
-            <a:normAutofit fontScale="97500" lnSpcReduction="10000"/>
-          </a:bodyPr>
-          <a:lstStyle>
-            <a:lvl1pPr algn="l" defTabSz="457200" rtl="0" eaLnBrk="1" latinLnBrk="0" hangingPunct="1">
-              <a:spcBef>
-                <a:spcPct val="0"/>
-              </a:spcBef>
-              <a:buNone/>
-              <a:defRPr sz="4800" kern="1200" cap="all">
-                <a:ln w="3175" cmpd="sng">
-                  <a:noFill/>
-                </a:ln>
-                <a:solidFill>
-                  <a:schemeClr val="tx1"/>
-                </a:solidFill>
-                <a:effectLst/>
-                <a:latin typeface="+mj-lt"/>
-                <a:ea typeface="+mj-ea"/>
-                <a:cs typeface="+mj-cs"/>
-              </a:defRPr>
-            </a:lvl1pPr>
-            <a:lvl2pPr eaLnBrk="1" hangingPunct="1">
-              <a:defRPr>
-                <a:solidFill>
-                  <a:schemeClr val="tx2"/>
-                </a:solidFill>
-              </a:defRPr>
-            </a:lvl2pPr>
-            <a:lvl3pPr eaLnBrk="1" hangingPunct="1">
-              <a:defRPr>
-                <a:solidFill>
-                  <a:schemeClr val="tx2"/>
-                </a:solidFill>
-              </a:defRPr>
-            </a:lvl3pPr>
-            <a:lvl4pPr eaLnBrk="1" hangingPunct="1">
-              <a:defRPr>
-                <a:solidFill>
-                  <a:schemeClr val="tx2"/>
-                </a:solidFill>
-              </a:defRPr>
-            </a:lvl4pPr>
-            <a:lvl5pPr eaLnBrk="1" hangingPunct="1">
-              <a:defRPr>
-                <a:solidFill>
-                  <a:schemeClr val="tx2"/>
-                </a:solidFill>
-              </a:defRPr>
-            </a:lvl5pPr>
-            <a:lvl6pPr eaLnBrk="1" hangingPunct="1">
-              <a:defRPr>
-                <a:solidFill>
-                  <a:schemeClr val="tx2"/>
-                </a:solidFill>
-              </a:defRPr>
-            </a:lvl6pPr>
-            <a:lvl7pPr eaLnBrk="1" hangingPunct="1">
-              <a:defRPr>
-                <a:solidFill>
-                  <a:schemeClr val="tx2"/>
-                </a:solidFill>
-              </a:defRPr>
-            </a:lvl7pPr>
-            <a:lvl8pPr eaLnBrk="1" hangingPunct="1">
-              <a:defRPr>
-                <a:solidFill>
-                  <a:schemeClr val="tx2"/>
-                </a:solidFill>
-              </a:defRPr>
-            </a:lvl8pPr>
-            <a:lvl9pPr eaLnBrk="1" hangingPunct="1">
-              <a:defRPr>
-                <a:solidFill>
-                  <a:schemeClr val="tx2"/>
-                </a:solidFill>
-              </a:defRPr>
-            </a:lvl9pPr>
-          </a:lstStyle>
-          <a:p>
-            <a:r>
-              <a:rPr lang="ru-RU" dirty="0"/>
-              <a:t>улучшение бота</a:t>
-            </a:r>
-          </a:p>
-        </p:txBody>
-      </p:sp>
-      <p:sp>
-        <p:nvSpPr>
-          <p:cNvPr id="8" name="Подзаголовок 2">
-            <a:extLst>
-              <a:ext uri="{FF2B5EF4-FFF2-40B4-BE49-F238E27FC236}">
-                <a16:creationId xmlns:a16="http://schemas.microsoft.com/office/drawing/2014/main" id="{4556E863-C434-49CE-9FA5-3D0695405E43}"/>
-              </a:ext>
-            </a:extLst>
-          </p:cNvPr>
-          <p:cNvSpPr txBox="1">
-            <a:spLocks/>
-          </p:cNvSpPr>
-          <p:nvPr/>
-        </p:nvSpPr>
-        <p:spPr>
-          <a:xfrm>
-            <a:off x="484272" y="3841069"/>
-            <a:ext cx="7981618" cy="2767360"/>
-          </a:xfrm>
-          <a:prstGeom prst="rect">
-            <a:avLst/>
-          </a:prstGeom>
-        </p:spPr>
-        <p:txBody>
-          <a:bodyPr vert="horz" lIns="91440" tIns="45720" rIns="91440" bIns="45720" rtlCol="0" anchor="t">
-            <a:normAutofit/>
-          </a:bodyPr>
-          <a:lstStyle>
-            <a:lvl1pPr marL="0" indent="0" algn="l" defTabSz="457200" rtl="0" eaLnBrk="1" latinLnBrk="0" hangingPunct="1">
-              <a:spcBef>
-                <a:spcPct val="20000"/>
-              </a:spcBef>
-              <a:spcAft>
-                <a:spcPts val="600"/>
-              </a:spcAft>
-              <a:buClr>
-                <a:schemeClr val="tx1"/>
-              </a:buClr>
-              <a:buSzPct val="80000"/>
-              <a:buFont typeface="Wingdings 3" panose="05040102010807070707" pitchFamily="18" charset="2"/>
-              <a:buNone/>
-              <a:defRPr sz="2100" kern="1200" cap="none">
-                <a:solidFill>
-                  <a:schemeClr val="bg2">
-                    <a:lumMod val="75000"/>
-                  </a:schemeClr>
-                </a:solidFill>
-                <a:effectLst/>
-                <a:latin typeface="+mn-lt"/>
-                <a:ea typeface="+mn-ea"/>
-                <a:cs typeface="+mn-cs"/>
-              </a:defRPr>
-            </a:lvl1pPr>
-            <a:lvl2pPr marL="457200" indent="0" algn="ctr" defTabSz="457200" rtl="0" eaLnBrk="1" latinLnBrk="0" hangingPunct="1">
-              <a:spcBef>
-                <a:spcPct val="20000"/>
-              </a:spcBef>
-              <a:spcAft>
-                <a:spcPts val="600"/>
-              </a:spcAft>
-              <a:buClr>
-                <a:schemeClr val="tx1"/>
-              </a:buClr>
-              <a:buSzPct val="80000"/>
-              <a:buFont typeface="Wingdings 3" panose="05040102010807070707" pitchFamily="18" charset="2"/>
-              <a:buNone/>
-              <a:defRPr sz="1800" kern="1200" cap="none">
-                <a:solidFill>
-                  <a:schemeClr val="tx1">
-                    <a:tint val="75000"/>
-                  </a:schemeClr>
-                </a:solidFill>
-                <a:effectLst/>
-                <a:latin typeface="+mn-lt"/>
-                <a:ea typeface="+mn-ea"/>
-                <a:cs typeface="+mn-cs"/>
-              </a:defRPr>
-            </a:lvl2pPr>
-            <a:lvl3pPr marL="914400" indent="0" algn="ctr" defTabSz="457200" rtl="0" eaLnBrk="1" latinLnBrk="0" hangingPunct="1">
-              <a:spcBef>
-                <a:spcPct val="20000"/>
-              </a:spcBef>
-              <a:spcAft>
-                <a:spcPts val="600"/>
-              </a:spcAft>
-              <a:buClr>
-                <a:schemeClr val="tx1"/>
-              </a:buClr>
-              <a:buSzPct val="80000"/>
-              <a:buFont typeface="Wingdings 3" panose="05040102010807070707" pitchFamily="18" charset="2"/>
-              <a:buNone/>
-              <a:defRPr sz="1600" kern="1200" cap="none">
-                <a:solidFill>
-                  <a:schemeClr val="tx1">
-                    <a:tint val="75000"/>
-                  </a:schemeClr>
-                </a:solidFill>
-                <a:effectLst/>
-                <a:latin typeface="+mn-lt"/>
-                <a:ea typeface="+mn-ea"/>
-                <a:cs typeface="+mn-cs"/>
-              </a:defRPr>
-            </a:lvl3pPr>
-            <a:lvl4pPr marL="1371600" indent="0" algn="ctr" defTabSz="457200" rtl="0" eaLnBrk="1" latinLnBrk="0" hangingPunct="1">
-              <a:spcBef>
-                <a:spcPct val="20000"/>
-              </a:spcBef>
-              <a:spcAft>
-                <a:spcPts val="600"/>
-              </a:spcAft>
-              <a:buClr>
-                <a:schemeClr val="tx1"/>
-              </a:buClr>
-              <a:buSzPct val="80000"/>
-              <a:buFont typeface="Wingdings 3" panose="05040102010807070707" pitchFamily="18" charset="2"/>
-              <a:buNone/>
-              <a:defRPr sz="1400" kern="1200" cap="none">
-                <a:solidFill>
-                  <a:schemeClr val="tx1">
-                    <a:tint val="75000"/>
-                  </a:schemeClr>
-                </a:solidFill>
-                <a:effectLst/>
-                <a:latin typeface="+mn-lt"/>
-                <a:ea typeface="+mn-ea"/>
-                <a:cs typeface="+mn-cs"/>
-              </a:defRPr>
-            </a:lvl4pPr>
-            <a:lvl5pPr marL="1828800" indent="0" algn="ctr" defTabSz="457200" rtl="0" eaLnBrk="1" latinLnBrk="0" hangingPunct="1">
-              <a:spcBef>
-                <a:spcPct val="20000"/>
-              </a:spcBef>
-              <a:spcAft>
-                <a:spcPts val="600"/>
-              </a:spcAft>
-              <a:buClr>
-                <a:schemeClr val="tx1"/>
-              </a:buClr>
-              <a:buSzPct val="80000"/>
-              <a:buFont typeface="Wingdings 3" panose="05040102010807070707" pitchFamily="18" charset="2"/>
-              <a:buNone/>
-              <a:defRPr sz="1400" kern="1200" cap="none">
-                <a:solidFill>
-                  <a:schemeClr val="tx1">
-                    <a:tint val="75000"/>
-                  </a:schemeClr>
-                </a:solidFill>
-                <a:effectLst/>
-                <a:latin typeface="+mn-lt"/>
-                <a:ea typeface="+mn-ea"/>
-                <a:cs typeface="+mn-cs"/>
-              </a:defRPr>
-            </a:lvl5pPr>
-            <a:lvl6pPr marL="2286000" indent="0" algn="ctr" defTabSz="457200" rtl="0" eaLnBrk="1" latinLnBrk="0" hangingPunct="1">
-              <a:spcBef>
-                <a:spcPct val="20000"/>
-              </a:spcBef>
-              <a:spcAft>
-                <a:spcPts val="600"/>
-              </a:spcAft>
-              <a:buClr>
-                <a:schemeClr val="tx1"/>
-              </a:buClr>
-              <a:buSzPct val="80000"/>
-              <a:buFont typeface="Wingdings 3" panose="05040102010807070707" pitchFamily="18" charset="2"/>
-              <a:buNone/>
-              <a:defRPr sz="1400" kern="1200" cap="none">
-                <a:solidFill>
-                  <a:schemeClr val="tx1">
-                    <a:tint val="75000"/>
-                  </a:schemeClr>
-                </a:solidFill>
-                <a:effectLst/>
-                <a:latin typeface="+mn-lt"/>
-                <a:ea typeface="+mn-ea"/>
-                <a:cs typeface="+mn-cs"/>
-              </a:defRPr>
-            </a:lvl6pPr>
-            <a:lvl7pPr marL="2743200" indent="0" algn="ctr" defTabSz="457200" rtl="0" eaLnBrk="1" latinLnBrk="0" hangingPunct="1">
-              <a:spcBef>
-                <a:spcPct val="20000"/>
-              </a:spcBef>
-              <a:spcAft>
-                <a:spcPts val="600"/>
-              </a:spcAft>
-              <a:buClr>
-                <a:schemeClr val="tx1"/>
-              </a:buClr>
-              <a:buSzPct val="80000"/>
-              <a:buFont typeface="Wingdings 3" panose="05040102010807070707" pitchFamily="18" charset="2"/>
-              <a:buNone/>
-              <a:defRPr sz="1400" kern="1200" cap="none">
-                <a:solidFill>
-                  <a:schemeClr val="tx1">
-                    <a:tint val="75000"/>
-                  </a:schemeClr>
-                </a:solidFill>
-                <a:effectLst/>
-                <a:latin typeface="+mn-lt"/>
-                <a:ea typeface="+mn-ea"/>
-                <a:cs typeface="+mn-cs"/>
-              </a:defRPr>
-            </a:lvl7pPr>
-            <a:lvl8pPr marL="3200400" indent="0" algn="ctr" defTabSz="457200" rtl="0" eaLnBrk="1" latinLnBrk="0" hangingPunct="1">
-              <a:spcBef>
-                <a:spcPct val="20000"/>
-              </a:spcBef>
-              <a:spcAft>
-                <a:spcPts val="600"/>
-              </a:spcAft>
-              <a:buClr>
-                <a:schemeClr val="tx1"/>
-              </a:buClr>
-              <a:buSzPct val="80000"/>
-              <a:buFont typeface="Wingdings 3" panose="05040102010807070707" pitchFamily="18" charset="2"/>
-              <a:buNone/>
-              <a:defRPr sz="1400" kern="1200" cap="none">
-                <a:solidFill>
-                  <a:schemeClr val="tx1">
-                    <a:tint val="75000"/>
-                  </a:schemeClr>
-                </a:solidFill>
-                <a:effectLst/>
-                <a:latin typeface="+mn-lt"/>
-                <a:ea typeface="+mn-ea"/>
-                <a:cs typeface="+mn-cs"/>
-              </a:defRPr>
-            </a:lvl8pPr>
-            <a:lvl9pPr marL="3657600" indent="0" algn="ctr" defTabSz="457200" rtl="0" eaLnBrk="1" latinLnBrk="0" hangingPunct="1">
-              <a:spcBef>
-                <a:spcPct val="20000"/>
-              </a:spcBef>
-              <a:spcAft>
-                <a:spcPts val="600"/>
-              </a:spcAft>
-              <a:buClr>
-                <a:schemeClr val="tx1"/>
-              </a:buClr>
-              <a:buSzPct val="80000"/>
-              <a:buFont typeface="Wingdings 3" panose="05040102010807070707" pitchFamily="18" charset="2"/>
-              <a:buNone/>
-              <a:defRPr sz="1400" kern="1200" cap="none">
-                <a:solidFill>
-                  <a:schemeClr val="tx1">
-                    <a:tint val="75000"/>
-                  </a:schemeClr>
-                </a:solidFill>
-                <a:effectLst/>
-                <a:latin typeface="+mn-lt"/>
-                <a:ea typeface="+mn-ea"/>
-                <a:cs typeface="+mn-cs"/>
-              </a:defRPr>
-            </a:lvl9pPr>
-          </a:lstStyle>
-          <a:p>
-            <a:r>
-              <a:rPr lang="ru-RU" dirty="0"/>
-              <a:t>Создание файла с шаблонами сообщений, отправляемых пользователю</a:t>
-            </a:r>
-          </a:p>
-          <a:p>
-            <a:r>
-              <a:rPr lang="ru-RU" dirty="0"/>
-              <a:t>Выбор команд «на лету»</a:t>
-            </a:r>
-            <a:endParaRPr lang="en-US" dirty="0"/>
-          </a:p>
-          <a:p>
-            <a:r>
-              <a:rPr lang="ru-RU" dirty="0"/>
-              <a:t>Добавления </a:t>
-            </a:r>
-            <a:r>
-              <a:rPr lang="en-US" dirty="0"/>
-              <a:t>cancel </a:t>
-            </a:r>
-            <a:r>
-              <a:rPr lang="ru-RU" dirty="0"/>
-              <a:t>в виде команды/горячей клавиши</a:t>
-            </a:r>
-          </a:p>
-          <a:p>
-            <a:endParaRPr lang="en-US" dirty="0"/>
-          </a:p>
-          <a:p>
-            <a:endParaRPr lang="ru-RU" dirty="0"/>
-          </a:p>
-          <a:p>
-            <a:endParaRPr lang="en-US" dirty="0"/>
-          </a:p>
-          <a:p>
-            <a:endParaRPr lang="ru-RU" dirty="0"/>
-          </a:p>
-        </p:txBody>
-      </p:sp>
-    </p:spTree>
-    <p:extLst>
-      <p:ext uri="{BB962C8B-B14F-4D97-AF65-F5344CB8AC3E}">
-        <p14:creationId xmlns:p14="http://schemas.microsoft.com/office/powerpoint/2010/main" val="212391641"/>
-      </p:ext>
-    </p:extLst>
-  </p:cSld>
-  <p:clrMapOvr>
-    <a:masterClrMapping/>
-  </p:clrMapOvr>
-</p:sld>
-</file>
-
-<file path=ppt/slides/slide8.xml><?xml version="1.0" encoding="utf-8"?>
-<p:sld xmlns:a="http://schemas.openxmlformats.org/drawingml/2006/main" xmlns:r="http://schemas.openxmlformats.org/officeDocument/2006/relationships" xmlns:p="http://schemas.openxmlformats.org/presentationml/2006/main">
-  <p:cSld>
-    <p:spTree>
-      <p:nvGrpSpPr>
-        <p:cNvPr id="1" name=""/>
-        <p:cNvGrpSpPr/>
-        <p:nvPr/>
-      </p:nvGrpSpPr>
-      <p:grpSpPr>
-        <a:xfrm>
-          <a:off x="0" y="0"/>
-          <a:ext cx="0" cy="0"/>
-          <a:chOff x="0" y="0"/>
-          <a:chExt cx="0" cy="0"/>
-        </a:xfrm>
-      </p:grpSpPr>
-      <p:sp>
-        <p:nvSpPr>
-          <p:cNvPr id="2" name="Заголовок 1">
-            <a:extLst>
-              <a:ext uri="{FF2B5EF4-FFF2-40B4-BE49-F238E27FC236}">
-                <a16:creationId xmlns:a16="http://schemas.microsoft.com/office/drawing/2014/main" id="{4EE3562E-5A77-439A-9C54-43C6C57D7DA4}"/>
-              </a:ext>
-            </a:extLst>
-          </p:cNvPr>
-          <p:cNvSpPr>
-            <a:spLocks noGrp="1"/>
-          </p:cNvSpPr>
-          <p:nvPr>
-            <p:ph type="ctrTitle"/>
-          </p:nvPr>
-        </p:nvSpPr>
-        <p:spPr>
-          <a:xfrm>
-            <a:off x="1123680" y="2147581"/>
-            <a:ext cx="8384288" cy="1082180"/>
-          </a:xfrm>
-        </p:spPr>
-        <p:txBody>
-          <a:bodyPr>
-            <a:normAutofit/>
-          </a:bodyPr>
-          <a:lstStyle/>
-          <a:p>
-            <a:r>
-              <a:rPr lang="ru-RU" dirty="0"/>
-              <a:t>Спасибо за внимание</a:t>
-            </a:r>
-          </a:p>
-        </p:txBody>
-      </p:sp>
-      <p:pic>
-        <p:nvPicPr>
-          <p:cNvPr id="6" name="Рисунок 5">
-            <a:extLst>
-              <a:ext uri="{FF2B5EF4-FFF2-40B4-BE49-F238E27FC236}">
-                <a16:creationId xmlns:a16="http://schemas.microsoft.com/office/drawing/2014/main" id="{FF2FCD40-9FBC-486D-8614-26502494FDA1}"/>
-              </a:ext>
-            </a:extLst>
-          </p:cNvPr>
-          <p:cNvPicPr>
-            <a:picLocks noChangeAspect="1"/>
-          </p:cNvPicPr>
-          <p:nvPr/>
-        </p:nvPicPr>
-        <p:blipFill>
-          <a:blip r:embed="rId2"/>
-          <a:stretch>
-            <a:fillRect/>
-          </a:stretch>
-        </p:blipFill>
-        <p:spPr>
-          <a:xfrm>
-            <a:off x="10645629" y="5656487"/>
-            <a:ext cx="1546371" cy="1201513"/>
-          </a:xfrm>
-          <a:prstGeom prst="rect">
-            <a:avLst/>
-          </a:prstGeom>
-        </p:spPr>
-      </p:pic>
-      <p:pic>
-        <p:nvPicPr>
-          <p:cNvPr id="1026" name="Picture 2">
-            <a:extLst>
-              <a:ext uri="{FF2B5EF4-FFF2-40B4-BE49-F238E27FC236}">
-                <a16:creationId xmlns:a16="http://schemas.microsoft.com/office/drawing/2014/main" id="{1853E300-D2AB-4D1B-9D00-064856279FD2}"/>
-              </a:ext>
-            </a:extLst>
-          </p:cNvPr>
-          <p:cNvPicPr>
-            <a:picLocks noChangeAspect="1" noChangeArrowheads="1"/>
-          </p:cNvPicPr>
-          <p:nvPr/>
-        </p:nvPicPr>
-        <p:blipFill>
-          <a:blip r:embed="rId3">
-            <a:extLst>
-              <a:ext uri="{28A0092B-C50C-407E-A947-70E740481C1C}">
-                <a14:useLocalDpi xmlns:a14="http://schemas.microsoft.com/office/drawing/2010/main" val="0"/>
-              </a:ext>
-            </a:extLst>
-          </a:blip>
-          <a:srcRect/>
-          <a:stretch>
-            <a:fillRect/>
-          </a:stretch>
-        </p:blipFill>
-        <p:spPr bwMode="auto">
-          <a:xfrm>
-            <a:off x="10645629" y="-186656"/>
-            <a:ext cx="1475230" cy="872455"/>
-          </a:xfrm>
-          <a:prstGeom prst="rect">
-            <a:avLst/>
-          </a:prstGeom>
-          <a:noFill/>
-          <a:extLst>
-            <a:ext uri="{909E8E84-426E-40DD-AFC4-6F175D3DCCD1}">
-              <a14:hiddenFill xmlns:a14="http://schemas.microsoft.com/office/drawing/2010/main">
-                <a:solidFill>
-                  <a:srgbClr val="FFFFFF"/>
-                </a:solidFill>
-              </a14:hiddenFill>
-            </a:ext>
-          </a:extLst>
-        </p:spPr>
-      </p:pic>
-    </p:spTree>
-    <p:extLst>
-      <p:ext uri="{BB962C8B-B14F-4D97-AF65-F5344CB8AC3E}">
-        <p14:creationId xmlns:p14="http://schemas.microsoft.com/office/powerpoint/2010/main" val="514858547"/>
       </p:ext>
     </p:extLst>
   </p:cSld>

</xml_diff>